<commit_message>
[Dokumenty] Usunięcie śmieciowych plików - po obronie
</commit_message>
<xml_diff>
--- a/Dokumenty/Obrona/Prezentacja.pptx
+++ b/Dokumenty/Obrona/Prezentacja.pptx
@@ -5,7 +5,7 @@
     <p:sldMasterId id="2147483648" r:id="rId1"/>
   </p:sldMasterIdLst>
   <p:notesMasterIdLst>
-    <p:notesMasterId r:id="rId29"/>
+    <p:notesMasterId r:id="rId28"/>
   </p:notesMasterIdLst>
   <p:sldIdLst>
     <p:sldId id="256" r:id="rId2"/>
@@ -23,18 +23,17 @@
     <p:sldId id="279" r:id="rId14"/>
     <p:sldId id="265" r:id="rId15"/>
     <p:sldId id="280" r:id="rId16"/>
-    <p:sldId id="284" r:id="rId17"/>
-    <p:sldId id="267" r:id="rId18"/>
-    <p:sldId id="285" r:id="rId19"/>
-    <p:sldId id="268" r:id="rId20"/>
-    <p:sldId id="269" r:id="rId21"/>
-    <p:sldId id="270" r:id="rId22"/>
-    <p:sldId id="271" r:id="rId23"/>
-    <p:sldId id="272" r:id="rId24"/>
-    <p:sldId id="273" r:id="rId25"/>
-    <p:sldId id="281" r:id="rId26"/>
-    <p:sldId id="274" r:id="rId27"/>
-    <p:sldId id="282" r:id="rId28"/>
+    <p:sldId id="267" r:id="rId17"/>
+    <p:sldId id="285" r:id="rId18"/>
+    <p:sldId id="268" r:id="rId19"/>
+    <p:sldId id="269" r:id="rId20"/>
+    <p:sldId id="270" r:id="rId21"/>
+    <p:sldId id="271" r:id="rId22"/>
+    <p:sldId id="272" r:id="rId23"/>
+    <p:sldId id="273" r:id="rId24"/>
+    <p:sldId id="281" r:id="rId25"/>
+    <p:sldId id="274" r:id="rId26"/>
+    <p:sldId id="282" r:id="rId27"/>
   </p:sldIdLst>
   <p:sldSz cx="9144000" cy="6858000" type="screen4x3"/>
   <p:notesSz cx="6858000" cy="9144000"/>
@@ -219,7 +218,7 @@
             <a:fld id="{6140D49B-E59E-4DEF-9E25-A60BC4E3CE4F}" type="datetimeFigureOut">
               <a:rPr lang="pl-PL" smtClean="0"/>
               <a:pPr/>
-              <a:t>2016-05-19</a:t>
+              <a:t>2016-05-24</a:t>
             </a:fld>
             <a:endParaRPr lang="pl-PL"/>
           </a:p>
@@ -561,7 +560,7 @@
           <a:p>
             <a:pPr>
               <a:buFont typeface="Arial" pitchFamily="34" charset="0"/>
-              <a:buChar char="•"/>
+              <a:buNone/>
             </a:pPr>
             <a:r>
               <a:rPr lang="pl-PL" sz="1200" kern="1200" baseline="0" dirty="0" smtClean="0">
@@ -572,18 +571,7 @@
                 <a:ea typeface="+mn-ea"/>
                 <a:cs typeface="+mn-cs"/>
               </a:rPr>
-              <a:t> Powiązanie z </a:t>
-            </a:r>
-            <a:r>
-              <a:rPr lang="pl-PL" sz="1200" kern="1200" baseline="0" dirty="0" err="1" smtClean="0">
-                <a:solidFill>
-                  <a:schemeClr val="tx1"/>
-                </a:solidFill>
-                <a:latin typeface="+mn-lt"/>
-                <a:ea typeface="+mn-ea"/>
-                <a:cs typeface="+mn-cs"/>
-              </a:rPr>
-              <a:t>dronami</a:t>
+              <a:t>„Algorytm wyznaczania i wizualizacji obszaru przeszukanego wraz z implementacją przy wykorzystaniu systemu OpenStreetMap”</a:t>
             </a:r>
             <a:endParaRPr lang="pl-PL" sz="1200" kern="1200" baseline="0" dirty="0" smtClean="0">
               <a:solidFill>
@@ -608,8 +596,27 @@
                 <a:ea typeface="+mn-ea"/>
                 <a:cs typeface="+mn-cs"/>
               </a:rPr>
-              <a:t> Rozwiązanie wspomagające wykorzystanie bezzałogowych statków latających</a:t>
-            </a:r>
+              <a:t> Powiązanie z </a:t>
+            </a:r>
+            <a:r>
+              <a:rPr lang="pl-PL" sz="1200" kern="1200" baseline="0" dirty="0" err="1" smtClean="0">
+                <a:solidFill>
+                  <a:schemeClr val="tx1"/>
+                </a:solidFill>
+                <a:latin typeface="+mn-lt"/>
+                <a:ea typeface="+mn-ea"/>
+                <a:cs typeface="+mn-cs"/>
+              </a:rPr>
+              <a:t>dronami</a:t>
+            </a:r>
+            <a:endParaRPr lang="pl-PL" sz="1200" kern="1200" baseline="0" dirty="0" smtClean="0">
+              <a:solidFill>
+                <a:schemeClr val="tx1"/>
+              </a:solidFill>
+              <a:latin typeface="+mn-lt"/>
+              <a:ea typeface="+mn-ea"/>
+              <a:cs typeface="+mn-cs"/>
+            </a:endParaRPr>
           </a:p>
           <a:p>
             <a:pPr>
@@ -625,7 +632,18 @@
                 <a:ea typeface="+mn-ea"/>
                 <a:cs typeface="+mn-cs"/>
               </a:rPr>
-              <a:t> Cel pracy (czym jest obszar przeszukany)</a:t>
+              <a:t> Cel </a:t>
+            </a:r>
+            <a:r>
+              <a:rPr lang="pl-PL" sz="1200" kern="1200" baseline="0" dirty="0" smtClean="0">
+                <a:solidFill>
+                  <a:schemeClr val="tx1"/>
+                </a:solidFill>
+                <a:latin typeface="+mn-lt"/>
+                <a:ea typeface="+mn-ea"/>
+                <a:cs typeface="+mn-cs"/>
+              </a:rPr>
+              <a:t>pracy (czym jest obszar przeszukany)</a:t>
             </a:r>
           </a:p>
           <a:p>
@@ -738,7 +756,7 @@
               <a:t> Rozwinięcie algorytmu </a:t>
             </a:r>
             <a:r>
-              <a:rPr lang="pl-PL" sz="1200" kern="1200" baseline="0" dirty="0" err="1" smtClean="0">
+              <a:rPr lang="pl-PL" sz="1200" kern="1200" baseline="0" dirty="0" smtClean="0">
                 <a:solidFill>
                   <a:schemeClr val="tx1"/>
                 </a:solidFill>
@@ -746,19 +764,16 @@
                 <a:ea typeface="+mn-ea"/>
                 <a:cs typeface="+mn-cs"/>
               </a:rPr>
-              <a:t>podstawoweog</a:t>
-            </a:r>
-            <a:r>
-              <a:rPr lang="pl-PL" sz="1200" kern="1200" baseline="0" dirty="0" smtClean="0">
-                <a:solidFill>
-                  <a:schemeClr val="tx1"/>
-                </a:solidFill>
-                <a:latin typeface="+mn-lt"/>
-                <a:ea typeface="+mn-ea"/>
-                <a:cs typeface="+mn-cs"/>
-              </a:rPr>
-              <a:t>,</a:t>
-            </a:r>
+              <a:t>podstawowego,</a:t>
+            </a:r>
+            <a:endParaRPr lang="pl-PL" sz="1200" kern="1200" baseline="0" dirty="0" smtClean="0">
+              <a:solidFill>
+                <a:schemeClr val="tx1"/>
+              </a:solidFill>
+              <a:latin typeface="+mn-lt"/>
+              <a:ea typeface="+mn-ea"/>
+              <a:cs typeface="+mn-cs"/>
+            </a:endParaRPr>
           </a:p>
           <a:p>
             <a:pPr>
@@ -1196,7 +1211,18 @@
                 <a:ea typeface="+mn-ea"/>
                 <a:cs typeface="+mn-cs"/>
               </a:rPr>
-              <a:t> pogrupowanie</a:t>
+              <a:t> </a:t>
+            </a:r>
+            <a:r>
+              <a:rPr lang="pl-PL" sz="1200" kern="1200" baseline="0" dirty="0" smtClean="0">
+                <a:solidFill>
+                  <a:schemeClr val="tx1"/>
+                </a:solidFill>
+                <a:latin typeface="+mn-lt"/>
+                <a:ea typeface="+mn-ea"/>
+                <a:cs typeface="+mn-cs"/>
+              </a:rPr>
+              <a:t>Dobranie skoku</a:t>
             </a:r>
           </a:p>
           <a:p>
@@ -1213,7 +1239,54 @@
                 <a:ea typeface="+mn-ea"/>
                 <a:cs typeface="+mn-cs"/>
               </a:rPr>
-              <a:t> wielokąt wklęsły</a:t>
+              <a:t> Pogrupowanie</a:t>
+            </a:r>
+            <a:endParaRPr lang="pl-PL" sz="1200" kern="1200" baseline="0" dirty="0" smtClean="0">
+              <a:solidFill>
+                <a:schemeClr val="tx1"/>
+              </a:solidFill>
+              <a:latin typeface="+mn-lt"/>
+              <a:ea typeface="+mn-ea"/>
+              <a:cs typeface="+mn-cs"/>
+            </a:endParaRPr>
+          </a:p>
+          <a:p>
+            <a:pPr>
+              <a:buFont typeface="Arial" pitchFamily="34" charset="0"/>
+              <a:buChar char="•"/>
+            </a:pPr>
+            <a:r>
+              <a:rPr lang="pl-PL" sz="1200" kern="1200" baseline="0" dirty="0" smtClean="0">
+                <a:solidFill>
+                  <a:schemeClr val="tx1"/>
+                </a:solidFill>
+                <a:latin typeface="+mn-lt"/>
+                <a:ea typeface="+mn-ea"/>
+                <a:cs typeface="+mn-cs"/>
+              </a:rPr>
+              <a:t> </a:t>
+            </a:r>
+            <a:r>
+              <a:rPr lang="pl-PL" sz="1200" kern="1200" baseline="0" dirty="0" smtClean="0">
+                <a:solidFill>
+                  <a:schemeClr val="tx1"/>
+                </a:solidFill>
+                <a:latin typeface="+mn-lt"/>
+                <a:ea typeface="+mn-ea"/>
+                <a:cs typeface="+mn-cs"/>
+              </a:rPr>
+              <a:t>Wielokąt </a:t>
+            </a:r>
+            <a:r>
+              <a:rPr lang="pl-PL" sz="1200" kern="1200" baseline="0" dirty="0" smtClean="0">
+                <a:solidFill>
+                  <a:schemeClr val="tx1"/>
+                </a:solidFill>
+                <a:latin typeface="+mn-lt"/>
+                <a:ea typeface="+mn-ea"/>
+                <a:cs typeface="+mn-cs"/>
+              </a:rPr>
+              <a:t>wklęsły</a:t>
             </a:r>
             <a:endParaRPr lang="pl-PL" sz="1200" kern="1200" dirty="0">
               <a:solidFill>
@@ -1341,8 +1414,27 @@
                 <a:ea typeface="+mn-ea"/>
                 <a:cs typeface="+mn-cs"/>
               </a:rPr>
-              <a:t> Zmiana położenia – nowy obszar – o postaci,</a:t>
-            </a:r>
+              <a:t> Zmiana położenia – nowy obszar – </a:t>
+            </a:r>
+            <a:r>
+              <a:rPr lang="pl-PL" sz="1200" kern="1200" baseline="0" dirty="0" smtClean="0">
+                <a:solidFill>
+                  <a:schemeClr val="tx1"/>
+                </a:solidFill>
+                <a:latin typeface="+mn-lt"/>
+                <a:ea typeface="+mn-ea"/>
+                <a:cs typeface="+mn-cs"/>
+              </a:rPr>
+              <a:t>często wielokąt wklęsły</a:t>
+            </a:r>
+            <a:endParaRPr lang="pl-PL" sz="1200" kern="1200" baseline="0" dirty="0" smtClean="0">
+              <a:solidFill>
+                <a:schemeClr val="tx1"/>
+              </a:solidFill>
+              <a:latin typeface="+mn-lt"/>
+              <a:ea typeface="+mn-ea"/>
+              <a:cs typeface="+mn-cs"/>
+            </a:endParaRPr>
           </a:p>
           <a:p>
             <a:pPr>
@@ -1794,29 +1886,16 @@
         <p:spPr/>
         <p:txBody>
           <a:bodyPr>
-            <a:normAutofit/>
+            <a:normAutofit fontScale="92500" lnSpcReduction="20000"/>
           </a:bodyPr>
           <a:lstStyle/>
           <a:p>
-            <a:pPr marL="0" marR="0" indent="0" algn="l" defTabSz="914400" rtl="0" eaLnBrk="1" fontAlgn="auto" latinLnBrk="0" hangingPunct="1">
-              <a:lnSpc>
-                <a:spcPct val="100000"/>
-              </a:lnSpc>
-              <a:spcBef>
-                <a:spcPts val="0"/>
-              </a:spcBef>
-              <a:spcAft>
-                <a:spcPts val="0"/>
-              </a:spcAft>
-              <a:buClrTx/>
-              <a:buSzTx/>
-              <a:buFontTx/>
-              <a:buNone/>
-              <a:tabLst/>
-              <a:defRPr/>
+            <a:pPr>
+              <a:buFont typeface="Arial" pitchFamily="34" charset="0"/>
+              <a:buChar char="•"/>
             </a:pPr>
             <a:r>
-              <a:rPr lang="pl-PL" sz="1200" b="1" kern="1200" dirty="0" smtClean="0">
+              <a:rPr lang="pl-PL" sz="1200" kern="1200" baseline="0" dirty="0" smtClean="0">
                 <a:solidFill>
                   <a:schemeClr val="tx1"/>
                 </a:solidFill>
@@ -1824,33 +1903,16 @@
                 <a:ea typeface="+mn-ea"/>
                 <a:cs typeface="+mn-cs"/>
               </a:rPr>
-              <a:t>Triangulacja </a:t>
-            </a:r>
-            <a:r>
-              <a:rPr lang="pl-PL" sz="1200" b="1" kern="1200" dirty="0" err="1" smtClean="0">
-                <a:solidFill>
-                  <a:schemeClr val="tx1"/>
-                </a:solidFill>
-                <a:latin typeface="+mn-lt"/>
-                <a:ea typeface="+mn-ea"/>
-                <a:cs typeface="+mn-cs"/>
-              </a:rPr>
-              <a:t>Delaunay</a:t>
-            </a:r>
-            <a:r>
-              <a:rPr lang="pl-PL" sz="1200" kern="1200" dirty="0" smtClean="0">
-                <a:solidFill>
-                  <a:schemeClr val="tx1"/>
-                </a:solidFill>
-                <a:latin typeface="+mn-lt"/>
-                <a:ea typeface="+mn-ea"/>
-                <a:cs typeface="+mn-cs"/>
-              </a:rPr>
-              <a:t> zbioru punktów P jest takim podziałem obszaru wyznaczonego przez ten zbiór na trójkąty, że żaden z punktów tego zbioru nie znajduje się we wnętrzu któregokolwiek z okręgów opisanych na trójkątach powstałych podczas triangulacji.</a:t>
-            </a:r>
-          </a:p>
-          <a:p>
-            <a:endParaRPr lang="pl-PL" dirty="0"/>
+              <a:t> generalizacja otoczki wypukłej</a:t>
+            </a:r>
+            <a:endParaRPr lang="pl-PL" sz="1200" kern="1200" dirty="0">
+              <a:solidFill>
+                <a:schemeClr val="tx1"/>
+              </a:solidFill>
+              <a:latin typeface="+mn-lt"/>
+              <a:ea typeface="+mn-ea"/>
+              <a:cs typeface="+mn-cs"/>
+            </a:endParaRPr>
           </a:p>
         </p:txBody>
       </p:sp>
@@ -1928,16 +1990,29 @@
         <p:spPr/>
         <p:txBody>
           <a:bodyPr>
-            <a:normAutofit fontScale="92500" lnSpcReduction="20000"/>
+            <a:normAutofit/>
           </a:bodyPr>
           <a:lstStyle/>
           <a:p>
-            <a:pPr>
+            <a:pPr marL="0" marR="0" indent="0" algn="l" defTabSz="914400" rtl="0" eaLnBrk="1" fontAlgn="auto" latinLnBrk="0" hangingPunct="1">
+              <a:lnSpc>
+                <a:spcPct val="100000"/>
+              </a:lnSpc>
+              <a:spcBef>
+                <a:spcPts val="0"/>
+              </a:spcBef>
+              <a:spcAft>
+                <a:spcPts val="0"/>
+              </a:spcAft>
+              <a:buClrTx/>
+              <a:buSzTx/>
               <a:buFont typeface="Arial" pitchFamily="34" charset="0"/>
               <a:buChar char="•"/>
+              <a:tabLst/>
+              <a:defRPr/>
             </a:pPr>
             <a:r>
-              <a:rPr lang="pl-PL" sz="1200" kern="1200" baseline="0" dirty="0" smtClean="0">
+              <a:rPr lang="pl-PL" sz="1200" kern="1200" dirty="0" smtClean="0">
                 <a:solidFill>
                   <a:schemeClr val="tx1"/>
                 </a:solidFill>
@@ -1945,9 +2020,173 @@
                 <a:ea typeface="+mn-ea"/>
                 <a:cs typeface="+mn-cs"/>
               </a:rPr>
-              <a:t> generalizacja otoczki wypukłej</a:t>
-            </a:r>
-            <a:endParaRPr lang="pl-PL" sz="1200" kern="1200" dirty="0">
+              <a:t> Omówienie poszczególnych kroków</a:t>
+            </a:r>
+          </a:p>
+          <a:p>
+            <a:pPr marL="0" marR="0" indent="0" algn="l" defTabSz="914400" rtl="0" eaLnBrk="1" fontAlgn="auto" latinLnBrk="0" hangingPunct="1">
+              <a:lnSpc>
+                <a:spcPct val="100000"/>
+              </a:lnSpc>
+              <a:spcBef>
+                <a:spcPts val="0"/>
+              </a:spcBef>
+              <a:spcAft>
+                <a:spcPts val="0"/>
+              </a:spcAft>
+              <a:buClrTx/>
+              <a:buSzTx/>
+              <a:buFont typeface="Arial" pitchFamily="34" charset="0"/>
+              <a:buChar char="•"/>
+              <a:tabLst/>
+              <a:defRPr/>
+            </a:pPr>
+            <a:r>
+              <a:rPr lang="pl-PL" sz="1200" kern="1200" dirty="0" smtClean="0">
+                <a:solidFill>
+                  <a:schemeClr val="tx1"/>
+                </a:solidFill>
+                <a:latin typeface="+mn-lt"/>
+                <a:ea typeface="+mn-ea"/>
+                <a:cs typeface="+mn-cs"/>
+              </a:rPr>
+              <a:t> Wykorzystanie biblioteki JTS oraz implementacji otoczki </a:t>
+            </a:r>
+            <a:r>
+              <a:rPr lang="pl-PL" sz="1200" kern="1200" dirty="0" err="1" smtClean="0">
+                <a:solidFill>
+                  <a:schemeClr val="tx1"/>
+                </a:solidFill>
+                <a:latin typeface="+mn-lt"/>
+                <a:ea typeface="+mn-ea"/>
+                <a:cs typeface="+mn-cs"/>
+              </a:rPr>
+              <a:t>α-wklęsłej</a:t>
+            </a:r>
+            <a:r>
+              <a:rPr lang="pl-PL" sz="1200" kern="1200" dirty="0" smtClean="0">
+                <a:solidFill>
+                  <a:schemeClr val="tx1"/>
+                </a:solidFill>
+                <a:latin typeface="+mn-lt"/>
+                <a:ea typeface="+mn-ea"/>
+                <a:cs typeface="+mn-cs"/>
+              </a:rPr>
+              <a:t> autorstwa </a:t>
+            </a:r>
+            <a:r>
+              <a:rPr lang="pl-PL" sz="1200" kern="1200" dirty="0" err="1" smtClean="0">
+                <a:solidFill>
+                  <a:schemeClr val="tx1"/>
+                </a:solidFill>
+                <a:latin typeface="+mn-lt"/>
+                <a:ea typeface="+mn-ea"/>
+                <a:cs typeface="+mn-cs"/>
+              </a:rPr>
+              <a:t>Eric'a</a:t>
+            </a:r>
+            <a:r>
+              <a:rPr lang="pl-PL" sz="1200" kern="1200" dirty="0" smtClean="0">
+                <a:solidFill>
+                  <a:schemeClr val="tx1"/>
+                </a:solidFill>
+                <a:latin typeface="+mn-lt"/>
+                <a:ea typeface="+mn-ea"/>
+                <a:cs typeface="+mn-cs"/>
+              </a:rPr>
+              <a:t> Grosso. </a:t>
+            </a:r>
+          </a:p>
+          <a:p>
+            <a:pPr marL="0" marR="0" indent="0" algn="l" defTabSz="914400" rtl="0" eaLnBrk="1" fontAlgn="auto" latinLnBrk="0" hangingPunct="1">
+              <a:lnSpc>
+                <a:spcPct val="100000"/>
+              </a:lnSpc>
+              <a:spcBef>
+                <a:spcPts val="0"/>
+              </a:spcBef>
+              <a:spcAft>
+                <a:spcPts val="0"/>
+              </a:spcAft>
+              <a:buClrTx/>
+              <a:buSzTx/>
+              <a:buFont typeface="Arial" pitchFamily="34" charset="0"/>
+              <a:buChar char="•"/>
+              <a:tabLst/>
+              <a:defRPr/>
+            </a:pPr>
+            <a:r>
+              <a:rPr lang="pl-PL" sz="1200" kern="1200" dirty="0" smtClean="0">
+                <a:solidFill>
+                  <a:schemeClr val="tx1"/>
+                </a:solidFill>
+                <a:latin typeface="+mn-lt"/>
+                <a:ea typeface="+mn-ea"/>
+                <a:cs typeface="+mn-cs"/>
+              </a:rPr>
+              <a:t> </a:t>
+            </a:r>
+          </a:p>
+          <a:p>
+            <a:pPr marL="0" marR="0" indent="0" algn="l" defTabSz="914400" rtl="0" eaLnBrk="1" fontAlgn="auto" latinLnBrk="0" hangingPunct="1">
+              <a:lnSpc>
+                <a:spcPct val="100000"/>
+              </a:lnSpc>
+              <a:spcBef>
+                <a:spcPts val="0"/>
+              </a:spcBef>
+              <a:spcAft>
+                <a:spcPts val="0"/>
+              </a:spcAft>
+              <a:buClrTx/>
+              <a:buSzTx/>
+              <a:buFont typeface="Arial" pitchFamily="34" charset="0"/>
+              <a:buChar char="•"/>
+              <a:tabLst/>
+              <a:defRPr/>
+            </a:pPr>
+            <a:r>
+              <a:rPr lang="pl-PL" sz="1200" kern="1200" dirty="0" smtClean="0">
+                <a:solidFill>
+                  <a:schemeClr val="tx1"/>
+                </a:solidFill>
+                <a:latin typeface="+mn-lt"/>
+                <a:ea typeface="+mn-ea"/>
+                <a:cs typeface="+mn-cs"/>
+              </a:rPr>
+              <a:t> Dobranie odpowiedniej wartości alfa</a:t>
+            </a:r>
+          </a:p>
+          <a:p>
+            <a:pPr marL="0" marR="0" indent="0" algn="l" defTabSz="914400" rtl="0" eaLnBrk="1" fontAlgn="auto" latinLnBrk="0" hangingPunct="1">
+              <a:lnSpc>
+                <a:spcPct val="100000"/>
+              </a:lnSpc>
+              <a:spcBef>
+                <a:spcPts val="0"/>
+              </a:spcBef>
+              <a:spcAft>
+                <a:spcPts val="0"/>
+              </a:spcAft>
+              <a:buClrTx/>
+              <a:buSzTx/>
+              <a:buFont typeface="Arial" pitchFamily="34" charset="0"/>
+              <a:buChar char="•"/>
+              <a:tabLst/>
+              <a:defRPr/>
+            </a:pPr>
+            <a:r>
+              <a:rPr lang="pl-PL" sz="1200" kern="1200" baseline="0" dirty="0" smtClean="0">
+                <a:solidFill>
+                  <a:schemeClr val="tx1"/>
+                </a:solidFill>
+                <a:latin typeface="+mn-lt"/>
+                <a:ea typeface="+mn-ea"/>
+                <a:cs typeface="+mn-cs"/>
+              </a:rPr>
+              <a:t> Jedynie przybliżenie</a:t>
+            </a:r>
+            <a:endParaRPr lang="pl-PL" sz="1200" kern="1200" dirty="0" smtClean="0">
               <a:solidFill>
                 <a:schemeClr val="tx1"/>
               </a:solidFill>
@@ -1955,6 +2194,9 @@
               <a:ea typeface="+mn-ea"/>
               <a:cs typeface="+mn-cs"/>
             </a:endParaRPr>
+          </a:p>
+          <a:p>
+            <a:endParaRPr lang="pl-PL" dirty="0"/>
           </a:p>
         </p:txBody>
       </p:sp>
@@ -2036,25 +2278,12 @@
           </a:bodyPr>
           <a:lstStyle/>
           <a:p>
-            <a:pPr marL="0" marR="0" indent="0" algn="l" defTabSz="914400" rtl="0" eaLnBrk="1" fontAlgn="auto" latinLnBrk="0" hangingPunct="1">
-              <a:lnSpc>
-                <a:spcPct val="100000"/>
-              </a:lnSpc>
-              <a:spcBef>
-                <a:spcPts val="0"/>
-              </a:spcBef>
-              <a:spcAft>
-                <a:spcPts val="0"/>
-              </a:spcAft>
-              <a:buClrTx/>
-              <a:buSzTx/>
+            <a:pPr>
               <a:buFont typeface="Arial" pitchFamily="34" charset="0"/>
               <a:buChar char="•"/>
-              <a:tabLst/>
-              <a:defRPr/>
             </a:pPr>
             <a:r>
-              <a:rPr lang="pl-PL" sz="1200" kern="1200" dirty="0" smtClean="0">
+              <a:rPr lang="pl-PL" sz="1200" kern="1200" baseline="0" dirty="0" smtClean="0">
                 <a:solidFill>
                   <a:schemeClr val="tx1"/>
                 </a:solidFill>
@@ -2062,173 +2291,9 @@
                 <a:ea typeface="+mn-ea"/>
                 <a:cs typeface="+mn-cs"/>
               </a:rPr>
-              <a:t> Omówienie poszczególnych kroków</a:t>
-            </a:r>
-          </a:p>
-          <a:p>
-            <a:pPr marL="0" marR="0" indent="0" algn="l" defTabSz="914400" rtl="0" eaLnBrk="1" fontAlgn="auto" latinLnBrk="0" hangingPunct="1">
-              <a:lnSpc>
-                <a:spcPct val="100000"/>
-              </a:lnSpc>
-              <a:spcBef>
-                <a:spcPts val="0"/>
-              </a:spcBef>
-              <a:spcAft>
-                <a:spcPts val="0"/>
-              </a:spcAft>
-              <a:buClrTx/>
-              <a:buSzTx/>
-              <a:buFont typeface="Arial" pitchFamily="34" charset="0"/>
-              <a:buChar char="•"/>
-              <a:tabLst/>
-              <a:defRPr/>
-            </a:pPr>
-            <a:r>
-              <a:rPr lang="pl-PL" sz="1200" kern="1200" dirty="0" smtClean="0">
-                <a:solidFill>
-                  <a:schemeClr val="tx1"/>
-                </a:solidFill>
-                <a:latin typeface="+mn-lt"/>
-                <a:ea typeface="+mn-ea"/>
-                <a:cs typeface="+mn-cs"/>
-              </a:rPr>
-              <a:t> Wykorzystanie biblioteki JTS oraz implementacji otoczki </a:t>
-            </a:r>
-            <a:r>
-              <a:rPr lang="pl-PL" sz="1200" kern="1200" dirty="0" err="1" smtClean="0">
-                <a:solidFill>
-                  <a:schemeClr val="tx1"/>
-                </a:solidFill>
-                <a:latin typeface="+mn-lt"/>
-                <a:ea typeface="+mn-ea"/>
-                <a:cs typeface="+mn-cs"/>
-              </a:rPr>
-              <a:t>α-wklęsłej</a:t>
-            </a:r>
-            <a:r>
-              <a:rPr lang="pl-PL" sz="1200" kern="1200" dirty="0" smtClean="0">
-                <a:solidFill>
-                  <a:schemeClr val="tx1"/>
-                </a:solidFill>
-                <a:latin typeface="+mn-lt"/>
-                <a:ea typeface="+mn-ea"/>
-                <a:cs typeface="+mn-cs"/>
-              </a:rPr>
-              <a:t> autorstwa </a:t>
-            </a:r>
-            <a:r>
-              <a:rPr lang="pl-PL" sz="1200" kern="1200" dirty="0" err="1" smtClean="0">
-                <a:solidFill>
-                  <a:schemeClr val="tx1"/>
-                </a:solidFill>
-                <a:latin typeface="+mn-lt"/>
-                <a:ea typeface="+mn-ea"/>
-                <a:cs typeface="+mn-cs"/>
-              </a:rPr>
-              <a:t>Eric'a</a:t>
-            </a:r>
-            <a:r>
-              <a:rPr lang="pl-PL" sz="1200" kern="1200" dirty="0" smtClean="0">
-                <a:solidFill>
-                  <a:schemeClr val="tx1"/>
-                </a:solidFill>
-                <a:latin typeface="+mn-lt"/>
-                <a:ea typeface="+mn-ea"/>
-                <a:cs typeface="+mn-cs"/>
-              </a:rPr>
-              <a:t> Grosso. </a:t>
-            </a:r>
-          </a:p>
-          <a:p>
-            <a:pPr marL="0" marR="0" indent="0" algn="l" defTabSz="914400" rtl="0" eaLnBrk="1" fontAlgn="auto" latinLnBrk="0" hangingPunct="1">
-              <a:lnSpc>
-                <a:spcPct val="100000"/>
-              </a:lnSpc>
-              <a:spcBef>
-                <a:spcPts val="0"/>
-              </a:spcBef>
-              <a:spcAft>
-                <a:spcPts val="0"/>
-              </a:spcAft>
-              <a:buClrTx/>
-              <a:buSzTx/>
-              <a:buFont typeface="Arial" pitchFamily="34" charset="0"/>
-              <a:buChar char="•"/>
-              <a:tabLst/>
-              <a:defRPr/>
-            </a:pPr>
-            <a:r>
-              <a:rPr lang="pl-PL" sz="1200" kern="1200" dirty="0" smtClean="0">
-                <a:solidFill>
-                  <a:schemeClr val="tx1"/>
-                </a:solidFill>
-                <a:latin typeface="+mn-lt"/>
-                <a:ea typeface="+mn-ea"/>
-                <a:cs typeface="+mn-cs"/>
-              </a:rPr>
-              <a:t> </a:t>
-            </a:r>
-          </a:p>
-          <a:p>
-            <a:pPr marL="0" marR="0" indent="0" algn="l" defTabSz="914400" rtl="0" eaLnBrk="1" fontAlgn="auto" latinLnBrk="0" hangingPunct="1">
-              <a:lnSpc>
-                <a:spcPct val="100000"/>
-              </a:lnSpc>
-              <a:spcBef>
-                <a:spcPts val="0"/>
-              </a:spcBef>
-              <a:spcAft>
-                <a:spcPts val="0"/>
-              </a:spcAft>
-              <a:buClrTx/>
-              <a:buSzTx/>
-              <a:buFont typeface="Arial" pitchFamily="34" charset="0"/>
-              <a:buChar char="•"/>
-              <a:tabLst/>
-              <a:defRPr/>
-            </a:pPr>
-            <a:r>
-              <a:rPr lang="pl-PL" sz="1200" kern="1200" dirty="0" smtClean="0">
-                <a:solidFill>
-                  <a:schemeClr val="tx1"/>
-                </a:solidFill>
-                <a:latin typeface="+mn-lt"/>
-                <a:ea typeface="+mn-ea"/>
-                <a:cs typeface="+mn-cs"/>
-              </a:rPr>
-              <a:t> Dobranie odpowiedniej wartości alfa</a:t>
-            </a:r>
-          </a:p>
-          <a:p>
-            <a:pPr marL="0" marR="0" indent="0" algn="l" defTabSz="914400" rtl="0" eaLnBrk="1" fontAlgn="auto" latinLnBrk="0" hangingPunct="1">
-              <a:lnSpc>
-                <a:spcPct val="100000"/>
-              </a:lnSpc>
-              <a:spcBef>
-                <a:spcPts val="0"/>
-              </a:spcBef>
-              <a:spcAft>
-                <a:spcPts val="0"/>
-              </a:spcAft>
-              <a:buClrTx/>
-              <a:buSzTx/>
-              <a:buFont typeface="Arial" pitchFamily="34" charset="0"/>
-              <a:buChar char="•"/>
-              <a:tabLst/>
-              <a:defRPr/>
-            </a:pPr>
-            <a:r>
-              <a:rPr lang="pl-PL" sz="1200" kern="1200" baseline="0" dirty="0" smtClean="0">
-                <a:solidFill>
-                  <a:schemeClr val="tx1"/>
-                </a:solidFill>
-                <a:latin typeface="+mn-lt"/>
-                <a:ea typeface="+mn-ea"/>
-                <a:cs typeface="+mn-cs"/>
-              </a:rPr>
-              <a:t> Jedynie przybliżenie</a:t>
-            </a:r>
-            <a:endParaRPr lang="pl-PL" sz="1200" kern="1200" dirty="0" smtClean="0">
+              <a:t> Zakończenie rozważań algorytmu kształtu alfa,</a:t>
+            </a:r>
+            <a:endParaRPr lang="pl-PL" sz="1200" kern="1200" dirty="0">
               <a:solidFill>
                 <a:schemeClr val="tx1"/>
               </a:solidFill>
@@ -2236,9 +2301,6 @@
               <a:ea typeface="+mn-ea"/>
               <a:cs typeface="+mn-cs"/>
             </a:endParaRPr>
-          </a:p>
-          <a:p>
-            <a:endParaRPr lang="pl-PL" dirty="0"/>
           </a:p>
         </p:txBody>
       </p:sp>
@@ -2320,29 +2382,15 @@
           </a:bodyPr>
           <a:lstStyle/>
           <a:p>
-            <a:pPr>
-              <a:buFont typeface="Arial" pitchFamily="34" charset="0"/>
-              <a:buChar char="•"/>
-            </a:pPr>
-            <a:r>
-              <a:rPr lang="pl-PL" sz="1200" kern="1200" baseline="0" dirty="0" smtClean="0">
-                <a:solidFill>
-                  <a:schemeClr val="tx1"/>
-                </a:solidFill>
-                <a:latin typeface="+mn-lt"/>
-                <a:ea typeface="+mn-ea"/>
-                <a:cs typeface="+mn-cs"/>
-              </a:rPr>
-              <a:t> Zakończenie rozważań algorytmu kształtu alfa,</a:t>
-            </a:r>
-            <a:endParaRPr lang="pl-PL" sz="1200" kern="1200" dirty="0">
-              <a:solidFill>
-                <a:schemeClr val="tx1"/>
-              </a:solidFill>
-              <a:latin typeface="+mn-lt"/>
-              <a:ea typeface="+mn-ea"/>
-              <a:cs typeface="+mn-cs"/>
-            </a:endParaRPr>
+            <a:r>
+              <a:rPr lang="pl-PL" dirty="0" smtClean="0"/>
+              <a:t>Otoczka</a:t>
+            </a:r>
+            <a:r>
+              <a:rPr lang="pl-PL" baseline="0" dirty="0" smtClean="0"/>
+              <a:t> wypukła</a:t>
+            </a:r>
+            <a:endParaRPr lang="pl-PL" dirty="0"/>
           </a:p>
         </p:txBody>
       </p:sp>
@@ -2514,12 +2562,26 @@
           <a:lstStyle/>
           <a:p>
             <a:r>
-              <a:rPr lang="pl-PL" dirty="0" smtClean="0"/>
-              <a:t>Otoczka</a:t>
-            </a:r>
-            <a:r>
-              <a:rPr lang="pl-PL" baseline="0" dirty="0" smtClean="0"/>
-              <a:t> wypukła</a:t>
+              <a:rPr lang="pl-PL" sz="1200" kern="1200" dirty="0" smtClean="0">
+                <a:solidFill>
+                  <a:schemeClr val="tx1"/>
+                </a:solidFill>
+                <a:latin typeface="+mn-lt"/>
+                <a:ea typeface="+mn-ea"/>
+                <a:cs typeface="+mn-cs"/>
+              </a:rPr>
+              <a:t>Efekt triangulacji </a:t>
+            </a:r>
+            <a:r>
+              <a:rPr lang="pl-PL" sz="1200" kern="1200" dirty="0" err="1" smtClean="0">
+                <a:solidFill>
+                  <a:schemeClr val="tx1"/>
+                </a:solidFill>
+                <a:latin typeface="+mn-lt"/>
+                <a:ea typeface="+mn-ea"/>
+                <a:cs typeface="+mn-cs"/>
+              </a:rPr>
+              <a:t>Delaunay</a:t>
             </a:r>
             <a:endParaRPr lang="pl-PL" dirty="0"/>
           </a:p>
@@ -2604,26 +2666,8 @@
           <a:lstStyle/>
           <a:p>
             <a:r>
-              <a:rPr lang="pl-PL" sz="1200" kern="1200" dirty="0" smtClean="0">
-                <a:solidFill>
-                  <a:schemeClr val="tx1"/>
-                </a:solidFill>
-                <a:latin typeface="+mn-lt"/>
-                <a:ea typeface="+mn-ea"/>
-                <a:cs typeface="+mn-cs"/>
-              </a:rPr>
-              <a:t>Efekt triangulacji </a:t>
-            </a:r>
-            <a:r>
-              <a:rPr lang="pl-PL" sz="1200" kern="1200" dirty="0" err="1" smtClean="0">
-                <a:solidFill>
-                  <a:schemeClr val="tx1"/>
-                </a:solidFill>
-                <a:latin typeface="+mn-lt"/>
-                <a:ea typeface="+mn-ea"/>
-                <a:cs typeface="+mn-cs"/>
-              </a:rPr>
-              <a:t>Delaunay</a:t>
+              <a:rPr lang="pl-PL" dirty="0" smtClean="0"/>
+              <a:t>Alfa = 0.1</a:t>
             </a:r>
             <a:endParaRPr lang="pl-PL" dirty="0"/>
           </a:p>
@@ -2709,7 +2753,7 @@
           <a:p>
             <a:r>
               <a:rPr lang="pl-PL" dirty="0" smtClean="0"/>
-              <a:t>Alfa = 0.1</a:t>
+              <a:t>Alfa = 1</a:t>
             </a:r>
             <a:endParaRPr lang="pl-PL" dirty="0"/>
           </a:p>
@@ -2795,7 +2839,7 @@
           <a:p>
             <a:r>
               <a:rPr lang="pl-PL" dirty="0" smtClean="0"/>
-              <a:t>Alfa = 1</a:t>
+              <a:t>Alfa = 0.24</a:t>
             </a:r>
             <a:endParaRPr lang="pl-PL" dirty="0"/>
           </a:p>
@@ -2879,11 +2923,316 @@
           </a:bodyPr>
           <a:lstStyle/>
           <a:p>
-            <a:r>
-              <a:rPr lang="pl-PL" dirty="0" smtClean="0"/>
-              <a:t>Alfa = 0.24</a:t>
-            </a:r>
-            <a:endParaRPr lang="pl-PL" dirty="0"/>
+            <a:pPr>
+              <a:buFont typeface="Arial" pitchFamily="34" charset="0"/>
+              <a:buChar char="•"/>
+            </a:pPr>
+            <a:r>
+              <a:rPr lang="pl-PL" sz="1200" kern="1200" dirty="0" smtClean="0">
+                <a:solidFill>
+                  <a:schemeClr val="tx1"/>
+                </a:solidFill>
+                <a:latin typeface="+mn-lt"/>
+                <a:ea typeface="+mn-ea"/>
+                <a:cs typeface="+mn-cs"/>
+              </a:rPr>
+              <a:t> projekt i implementacja</a:t>
+            </a:r>
+          </a:p>
+          <a:p>
+            <a:pPr>
+              <a:buFont typeface="Arial" pitchFamily="34" charset="0"/>
+              <a:buChar char="•"/>
+            </a:pPr>
+            <a:endParaRPr lang="pl-PL" sz="1200" kern="1200" dirty="0" smtClean="0">
+              <a:solidFill>
+                <a:schemeClr val="tx1"/>
+              </a:solidFill>
+              <a:latin typeface="+mn-lt"/>
+              <a:ea typeface="+mn-ea"/>
+              <a:cs typeface="+mn-cs"/>
+            </a:endParaRPr>
+          </a:p>
+          <a:p>
+            <a:pPr lvl="1">
+              <a:buFont typeface="Arial" pitchFamily="34" charset="0"/>
+              <a:buChar char="•"/>
+            </a:pPr>
+            <a:r>
+              <a:rPr lang="pl-PL" sz="1200" kern="1200" baseline="0" dirty="0" smtClean="0">
+                <a:solidFill>
+                  <a:schemeClr val="tx1"/>
+                </a:solidFill>
+                <a:latin typeface="+mn-lt"/>
+                <a:ea typeface="+mn-ea"/>
+                <a:cs typeface="+mn-cs"/>
+              </a:rPr>
+              <a:t> </a:t>
+            </a:r>
+            <a:r>
+              <a:rPr lang="pl-PL" sz="1200" kern="1200" dirty="0" err="1" smtClean="0">
+                <a:solidFill>
+                  <a:schemeClr val="tx1"/>
+                </a:solidFill>
+                <a:latin typeface="+mn-lt"/>
+                <a:ea typeface="+mn-ea"/>
+                <a:cs typeface="+mn-cs"/>
+              </a:rPr>
+              <a:t>DronTracker</a:t>
+            </a:r>
+            <a:r>
+              <a:rPr lang="pl-PL" sz="1200" kern="1200" dirty="0" smtClean="0">
+                <a:solidFill>
+                  <a:schemeClr val="tx1"/>
+                </a:solidFill>
+                <a:latin typeface="+mn-lt"/>
+                <a:ea typeface="+mn-ea"/>
+                <a:cs typeface="+mn-cs"/>
+              </a:rPr>
+              <a:t>,</a:t>
+            </a:r>
+          </a:p>
+          <a:p>
+            <a:pPr lvl="1">
+              <a:buFont typeface="Arial" pitchFamily="34" charset="0"/>
+              <a:buChar char="•"/>
+            </a:pPr>
+            <a:r>
+              <a:rPr lang="pl-PL" sz="1200" kern="1200" dirty="0" smtClean="0">
+                <a:solidFill>
+                  <a:schemeClr val="tx1"/>
+                </a:solidFill>
+                <a:latin typeface="+mn-lt"/>
+                <a:ea typeface="+mn-ea"/>
+                <a:cs typeface="+mn-cs"/>
+              </a:rPr>
+              <a:t> </a:t>
+            </a:r>
+            <a:r>
+              <a:rPr lang="pl-PL" sz="1200" kern="1200" dirty="0" err="1" smtClean="0">
+                <a:solidFill>
+                  <a:schemeClr val="tx1"/>
+                </a:solidFill>
+                <a:latin typeface="+mn-lt"/>
+                <a:ea typeface="+mn-ea"/>
+                <a:cs typeface="+mn-cs"/>
+              </a:rPr>
+              <a:t>DronSerwer</a:t>
+            </a:r>
+            <a:r>
+              <a:rPr lang="pl-PL" sz="1200" kern="1200" dirty="0" smtClean="0">
+                <a:solidFill>
+                  <a:schemeClr val="tx1"/>
+                </a:solidFill>
+                <a:latin typeface="+mn-lt"/>
+                <a:ea typeface="+mn-ea"/>
+                <a:cs typeface="+mn-cs"/>
+              </a:rPr>
+              <a:t>,</a:t>
+            </a:r>
+          </a:p>
+          <a:p>
+            <a:pPr lvl="1">
+              <a:buFont typeface="Arial" pitchFamily="34" charset="0"/>
+              <a:buChar char="•"/>
+            </a:pPr>
+            <a:r>
+              <a:rPr lang="pl-PL" sz="1200" kern="1200" dirty="0" smtClean="0">
+                <a:solidFill>
+                  <a:schemeClr val="tx1"/>
+                </a:solidFill>
+                <a:latin typeface="+mn-lt"/>
+                <a:ea typeface="+mn-ea"/>
+                <a:cs typeface="+mn-cs"/>
+              </a:rPr>
+              <a:t> </a:t>
+            </a:r>
+            <a:r>
+              <a:rPr lang="pl-PL" sz="1200" kern="1200" dirty="0" err="1" smtClean="0">
+                <a:solidFill>
+                  <a:schemeClr val="tx1"/>
+                </a:solidFill>
+                <a:latin typeface="+mn-lt"/>
+                <a:ea typeface="+mn-ea"/>
+                <a:cs typeface="+mn-cs"/>
+              </a:rPr>
+              <a:t>DronVision</a:t>
+            </a:r>
+            <a:endParaRPr lang="pl-PL" sz="1200" kern="1200" dirty="0" smtClean="0">
+              <a:solidFill>
+                <a:schemeClr val="tx1"/>
+              </a:solidFill>
+              <a:latin typeface="+mn-lt"/>
+              <a:ea typeface="+mn-ea"/>
+              <a:cs typeface="+mn-cs"/>
+            </a:endParaRPr>
+          </a:p>
+          <a:p>
+            <a:pPr lvl="1">
+              <a:buFont typeface="Arial" pitchFamily="34" charset="0"/>
+              <a:buChar char="•"/>
+            </a:pPr>
+            <a:endParaRPr lang="pl-PL" sz="1200" kern="1200" dirty="0">
+              <a:solidFill>
+                <a:schemeClr val="tx1"/>
+              </a:solidFill>
+              <a:latin typeface="+mn-lt"/>
+              <a:ea typeface="+mn-ea"/>
+              <a:cs typeface="+mn-cs"/>
+            </a:endParaRPr>
+          </a:p>
+          <a:p>
+            <a:pPr lvl="1">
+              <a:buFont typeface="Arial" pitchFamily="34" charset="0"/>
+              <a:buChar char="•"/>
+            </a:pPr>
+            <a:r>
+              <a:rPr lang="pl-PL" sz="1200" kern="1200" dirty="0" smtClean="0">
+                <a:solidFill>
+                  <a:schemeClr val="tx1"/>
+                </a:solidFill>
+                <a:latin typeface="+mn-lt"/>
+                <a:ea typeface="+mn-ea"/>
+                <a:cs typeface="+mn-cs"/>
+              </a:rPr>
+              <a:t>Android</a:t>
+            </a:r>
+            <a:r>
+              <a:rPr lang="pl-PL" sz="1200" kern="1200" baseline="0" dirty="0" smtClean="0">
+                <a:solidFill>
+                  <a:schemeClr val="tx1"/>
+                </a:solidFill>
+                <a:latin typeface="+mn-lt"/>
+                <a:ea typeface="+mn-ea"/>
+                <a:cs typeface="+mn-cs"/>
+              </a:rPr>
+              <a:t> – SDK,</a:t>
+            </a:r>
+          </a:p>
+          <a:p>
+            <a:pPr lvl="1">
+              <a:buFont typeface="Arial" pitchFamily="34" charset="0"/>
+              <a:buChar char="•"/>
+            </a:pPr>
+            <a:endParaRPr lang="pl-PL" sz="1200" kern="1200" baseline="0" dirty="0" smtClean="0">
+              <a:solidFill>
+                <a:schemeClr val="tx1"/>
+              </a:solidFill>
+              <a:latin typeface="+mn-lt"/>
+              <a:ea typeface="+mn-ea"/>
+              <a:cs typeface="+mn-cs"/>
+            </a:endParaRPr>
+          </a:p>
+          <a:p>
+            <a:pPr lvl="1">
+              <a:buFont typeface="Arial" pitchFamily="34" charset="0"/>
+              <a:buChar char="•"/>
+            </a:pPr>
+            <a:r>
+              <a:rPr lang="pl-PL" sz="1200" kern="1200" baseline="0" dirty="0" smtClean="0">
+                <a:solidFill>
+                  <a:schemeClr val="tx1"/>
+                </a:solidFill>
+                <a:latin typeface="+mn-lt"/>
+                <a:ea typeface="+mn-ea"/>
+                <a:cs typeface="+mn-cs"/>
+              </a:rPr>
+              <a:t>JAVA – </a:t>
+            </a:r>
+            <a:r>
+              <a:rPr lang="pl-PL" sz="1200" kern="1200" baseline="0" dirty="0" err="1" smtClean="0">
+                <a:solidFill>
+                  <a:schemeClr val="tx1"/>
+                </a:solidFill>
+                <a:latin typeface="+mn-lt"/>
+                <a:ea typeface="+mn-ea"/>
+                <a:cs typeface="+mn-cs"/>
+              </a:rPr>
+              <a:t>JAVA</a:t>
+            </a:r>
+            <a:r>
+              <a:rPr lang="pl-PL" sz="1200" kern="1200" baseline="0" dirty="0" smtClean="0">
+                <a:solidFill>
+                  <a:schemeClr val="tx1"/>
+                </a:solidFill>
+                <a:latin typeface="+mn-lt"/>
+                <a:ea typeface="+mn-ea"/>
+                <a:cs typeface="+mn-cs"/>
+              </a:rPr>
+              <a:t> EE – </a:t>
+            </a:r>
+            <a:r>
+              <a:rPr lang="pl-PL" sz="1200" kern="1200" baseline="0" dirty="0" err="1" smtClean="0">
+                <a:solidFill>
+                  <a:schemeClr val="tx1"/>
+                </a:solidFill>
+                <a:latin typeface="+mn-lt"/>
+                <a:ea typeface="+mn-ea"/>
+                <a:cs typeface="+mn-cs"/>
+              </a:rPr>
+              <a:t>WildFly</a:t>
+            </a:r>
+            <a:r>
+              <a:rPr lang="pl-PL" sz="1200" kern="1200" baseline="0" dirty="0" smtClean="0">
+                <a:solidFill>
+                  <a:schemeClr val="tx1"/>
+                </a:solidFill>
+                <a:latin typeface="+mn-lt"/>
+                <a:ea typeface="+mn-ea"/>
+                <a:cs typeface="+mn-cs"/>
+              </a:rPr>
+              <a:t>,</a:t>
+            </a:r>
+          </a:p>
+          <a:p>
+            <a:pPr lvl="1">
+              <a:buFont typeface="Arial" pitchFamily="34" charset="0"/>
+              <a:buChar char="•"/>
+            </a:pPr>
+            <a:endParaRPr lang="pl-PL" sz="1200" kern="1200" baseline="0" dirty="0" smtClean="0">
+              <a:solidFill>
+                <a:schemeClr val="tx1"/>
+              </a:solidFill>
+              <a:latin typeface="+mn-lt"/>
+              <a:ea typeface="+mn-ea"/>
+              <a:cs typeface="+mn-cs"/>
+            </a:endParaRPr>
+          </a:p>
+          <a:p>
+            <a:pPr lvl="1">
+              <a:buFont typeface="Arial" pitchFamily="34" charset="0"/>
+              <a:buChar char="•"/>
+            </a:pPr>
+            <a:r>
+              <a:rPr lang="pl-PL" sz="1200" kern="1200" baseline="0" dirty="0" smtClean="0">
+                <a:solidFill>
+                  <a:schemeClr val="tx1"/>
+                </a:solidFill>
+                <a:latin typeface="+mn-lt"/>
+                <a:ea typeface="+mn-ea"/>
+                <a:cs typeface="+mn-cs"/>
+              </a:rPr>
+              <a:t>OpenStreetMap - </a:t>
+            </a:r>
+            <a:r>
+              <a:rPr lang="pl-PL" sz="1200" kern="1200" baseline="0" dirty="0" err="1" smtClean="0">
+                <a:solidFill>
+                  <a:schemeClr val="tx1"/>
+                </a:solidFill>
+                <a:latin typeface="+mn-lt"/>
+                <a:ea typeface="+mn-ea"/>
+                <a:cs typeface="+mn-cs"/>
+              </a:rPr>
+              <a:t>OsmDroid</a:t>
+            </a:r>
+            <a:endParaRPr lang="pl-PL" sz="1200" kern="1200" dirty="0" smtClean="0">
+              <a:solidFill>
+                <a:schemeClr val="tx1"/>
+              </a:solidFill>
+              <a:latin typeface="+mn-lt"/>
+              <a:ea typeface="+mn-ea"/>
+              <a:cs typeface="+mn-cs"/>
+            </a:endParaRPr>
           </a:p>
         </p:txBody>
       </p:sp>
@@ -2970,7 +3319,7 @@
               <a:buChar char="•"/>
             </a:pPr>
             <a:r>
-              <a:rPr lang="pl-PL" sz="1200" kern="1200" dirty="0" smtClean="0">
+              <a:rPr lang="pl-PL" sz="1200" kern="1200" baseline="0" dirty="0" smtClean="0">
                 <a:solidFill>
                   <a:schemeClr val="tx1"/>
                 </a:solidFill>
@@ -2978,30 +3327,10 @@
                 <a:ea typeface="+mn-ea"/>
                 <a:cs typeface="+mn-cs"/>
               </a:rPr>
-              <a:t> projekt i implementacja</a:t>
-            </a:r>
-          </a:p>
-          <a:p>
-            <a:pPr>
-              <a:buFont typeface="Arial" pitchFamily="34" charset="0"/>
-              <a:buChar char="•"/>
-            </a:pPr>
-            <a:endParaRPr lang="pl-PL" sz="1200" kern="1200" dirty="0" smtClean="0">
-              <a:solidFill>
-                <a:schemeClr val="tx1"/>
-              </a:solidFill>
-              <a:latin typeface="+mn-lt"/>
-              <a:ea typeface="+mn-ea"/>
-              <a:cs typeface="+mn-cs"/>
-            </a:endParaRPr>
-          </a:p>
-          <a:p>
-            <a:pPr lvl="1">
-              <a:buFont typeface="Arial" pitchFamily="34" charset="0"/>
-              <a:buChar char="•"/>
-            </a:pPr>
-            <a:r>
-              <a:rPr lang="pl-PL" sz="1200" kern="1200" baseline="0" dirty="0" smtClean="0">
+              <a:t> działanie aplikacji </a:t>
+            </a:r>
+            <a:r>
+              <a:rPr lang="pl-PL" sz="1200" kern="1200" baseline="0" dirty="0" err="1" smtClean="0">
                 <a:solidFill>
                   <a:schemeClr val="tx1"/>
                 </a:solidFill>
@@ -3009,111 +3338,8 @@
                 <a:ea typeface="+mn-ea"/>
                 <a:cs typeface="+mn-cs"/>
               </a:rPr>
-              <a:t> </a:t>
-            </a:r>
-            <a:r>
-              <a:rPr lang="pl-PL" sz="1200" kern="1200" dirty="0" err="1" smtClean="0">
-                <a:solidFill>
-                  <a:schemeClr val="tx1"/>
-                </a:solidFill>
-                <a:latin typeface="+mn-lt"/>
-                <a:ea typeface="+mn-ea"/>
-                <a:cs typeface="+mn-cs"/>
-              </a:rPr>
-              <a:t>DronTracker</a:t>
-            </a:r>
-            <a:r>
-              <a:rPr lang="pl-PL" sz="1200" kern="1200" dirty="0" smtClean="0">
-                <a:solidFill>
-                  <a:schemeClr val="tx1"/>
-                </a:solidFill>
-                <a:latin typeface="+mn-lt"/>
-                <a:ea typeface="+mn-ea"/>
-                <a:cs typeface="+mn-cs"/>
-              </a:rPr>
-              <a:t>,</a:t>
-            </a:r>
-          </a:p>
-          <a:p>
-            <a:pPr lvl="1">
-              <a:buFont typeface="Arial" pitchFamily="34" charset="0"/>
-              <a:buChar char="•"/>
-            </a:pPr>
-            <a:r>
-              <a:rPr lang="pl-PL" sz="1200" kern="1200" dirty="0" smtClean="0">
-                <a:solidFill>
-                  <a:schemeClr val="tx1"/>
-                </a:solidFill>
-                <a:latin typeface="+mn-lt"/>
-                <a:ea typeface="+mn-ea"/>
-                <a:cs typeface="+mn-cs"/>
-              </a:rPr>
-              <a:t> </a:t>
-            </a:r>
-            <a:r>
-              <a:rPr lang="pl-PL" sz="1200" kern="1200" dirty="0" err="1" smtClean="0">
-                <a:solidFill>
-                  <a:schemeClr val="tx1"/>
-                </a:solidFill>
-                <a:latin typeface="+mn-lt"/>
-                <a:ea typeface="+mn-ea"/>
-                <a:cs typeface="+mn-cs"/>
-              </a:rPr>
-              <a:t>DronSerwer</a:t>
-            </a:r>
-            <a:r>
-              <a:rPr lang="pl-PL" sz="1200" kern="1200" dirty="0" smtClean="0">
-                <a:solidFill>
-                  <a:schemeClr val="tx1"/>
-                </a:solidFill>
-                <a:latin typeface="+mn-lt"/>
-                <a:ea typeface="+mn-ea"/>
-                <a:cs typeface="+mn-cs"/>
-              </a:rPr>
-              <a:t>,</a:t>
-            </a:r>
-          </a:p>
-          <a:p>
-            <a:pPr lvl="1">
-              <a:buFont typeface="Arial" pitchFamily="34" charset="0"/>
-              <a:buChar char="•"/>
-            </a:pPr>
-            <a:r>
-              <a:rPr lang="pl-PL" sz="1200" kern="1200" dirty="0" smtClean="0">
-                <a:solidFill>
-                  <a:schemeClr val="tx1"/>
-                </a:solidFill>
-                <a:latin typeface="+mn-lt"/>
-                <a:ea typeface="+mn-ea"/>
-                <a:cs typeface="+mn-cs"/>
-              </a:rPr>
-              <a:t> </a:t>
-            </a:r>
-            <a:r>
-              <a:rPr lang="pl-PL" sz="1200" kern="1200" dirty="0" err="1" smtClean="0">
-                <a:solidFill>
-                  <a:schemeClr val="tx1"/>
-                </a:solidFill>
-                <a:latin typeface="+mn-lt"/>
-                <a:ea typeface="+mn-ea"/>
-                <a:cs typeface="+mn-cs"/>
-              </a:rPr>
               <a:t>DronVision</a:t>
             </a:r>
-            <a:endParaRPr lang="pl-PL" sz="1200" kern="1200" dirty="0" smtClean="0">
-              <a:solidFill>
-                <a:schemeClr val="tx1"/>
-              </a:solidFill>
-              <a:latin typeface="+mn-lt"/>
-              <a:ea typeface="+mn-ea"/>
-              <a:cs typeface="+mn-cs"/>
-            </a:endParaRPr>
-          </a:p>
-          <a:p>
-            <a:pPr lvl="1">
-              <a:buFont typeface="Arial" pitchFamily="34" charset="0"/>
-              <a:buChar char="•"/>
-            </a:pPr>
             <a:endParaRPr lang="pl-PL" sz="1200" kern="1200" dirty="0">
               <a:solidFill>
                 <a:schemeClr val="tx1"/>
@@ -3123,159 +3349,6 @@
               <a:cs typeface="+mn-cs"/>
             </a:endParaRPr>
           </a:p>
-          <a:p>
-            <a:pPr lvl="1">
-              <a:buFont typeface="Arial" pitchFamily="34" charset="0"/>
-              <a:buChar char="•"/>
-            </a:pPr>
-            <a:r>
-              <a:rPr lang="pl-PL" sz="1200" kern="1200" dirty="0" smtClean="0">
-                <a:solidFill>
-                  <a:schemeClr val="tx1"/>
-                </a:solidFill>
-                <a:latin typeface="+mn-lt"/>
-                <a:ea typeface="+mn-ea"/>
-                <a:cs typeface="+mn-cs"/>
-              </a:rPr>
-              <a:t>Android</a:t>
-            </a:r>
-            <a:r>
-              <a:rPr lang="pl-PL" sz="1200" kern="1200" baseline="0" dirty="0" smtClean="0">
-                <a:solidFill>
-                  <a:schemeClr val="tx1"/>
-                </a:solidFill>
-                <a:latin typeface="+mn-lt"/>
-                <a:ea typeface="+mn-ea"/>
-                <a:cs typeface="+mn-cs"/>
-              </a:rPr>
-              <a:t> – SDK,</a:t>
-            </a:r>
-          </a:p>
-          <a:p>
-            <a:pPr lvl="1">
-              <a:buFont typeface="Arial" pitchFamily="34" charset="0"/>
-              <a:buChar char="•"/>
-            </a:pPr>
-            <a:endParaRPr lang="pl-PL" sz="1200" kern="1200" baseline="0" dirty="0" smtClean="0">
-              <a:solidFill>
-                <a:schemeClr val="tx1"/>
-              </a:solidFill>
-              <a:latin typeface="+mn-lt"/>
-              <a:ea typeface="+mn-ea"/>
-              <a:cs typeface="+mn-cs"/>
-            </a:endParaRPr>
-          </a:p>
-          <a:p>
-            <a:pPr lvl="1">
-              <a:buFont typeface="Arial" pitchFamily="34" charset="0"/>
-              <a:buChar char="•"/>
-            </a:pPr>
-            <a:r>
-              <a:rPr lang="pl-PL" sz="1200" kern="1200" baseline="0" dirty="0" smtClean="0">
-                <a:solidFill>
-                  <a:schemeClr val="tx1"/>
-                </a:solidFill>
-                <a:latin typeface="+mn-lt"/>
-                <a:ea typeface="+mn-ea"/>
-                <a:cs typeface="+mn-cs"/>
-              </a:rPr>
-              <a:t>JAVA – </a:t>
-            </a:r>
-            <a:r>
-              <a:rPr lang="pl-PL" sz="1200" kern="1200" baseline="0" dirty="0" err="1" smtClean="0">
-                <a:solidFill>
-                  <a:schemeClr val="tx1"/>
-                </a:solidFill>
-                <a:latin typeface="+mn-lt"/>
-                <a:ea typeface="+mn-ea"/>
-                <a:cs typeface="+mn-cs"/>
-              </a:rPr>
-              <a:t>JAVA</a:t>
-            </a:r>
-            <a:r>
-              <a:rPr lang="pl-PL" sz="1200" kern="1200" baseline="0" dirty="0" smtClean="0">
-                <a:solidFill>
-                  <a:schemeClr val="tx1"/>
-                </a:solidFill>
-                <a:latin typeface="+mn-lt"/>
-                <a:ea typeface="+mn-ea"/>
-                <a:cs typeface="+mn-cs"/>
-              </a:rPr>
-              <a:t> EE – </a:t>
-            </a:r>
-            <a:r>
-              <a:rPr lang="pl-PL" sz="1200" kern="1200" baseline="0" dirty="0" err="1" smtClean="0">
-                <a:solidFill>
-                  <a:schemeClr val="tx1"/>
-                </a:solidFill>
-                <a:latin typeface="+mn-lt"/>
-                <a:ea typeface="+mn-ea"/>
-                <a:cs typeface="+mn-cs"/>
-              </a:rPr>
-              <a:t>WildFly</a:t>
-            </a:r>
-            <a:r>
-              <a:rPr lang="pl-PL" sz="1200" kern="1200" baseline="0" dirty="0" smtClean="0">
-                <a:solidFill>
-                  <a:schemeClr val="tx1"/>
-                </a:solidFill>
-                <a:latin typeface="+mn-lt"/>
-                <a:ea typeface="+mn-ea"/>
-                <a:cs typeface="+mn-cs"/>
-              </a:rPr>
-              <a:t>,</a:t>
-            </a:r>
-          </a:p>
-          <a:p>
-            <a:pPr lvl="1">
-              <a:buFont typeface="Arial" pitchFamily="34" charset="0"/>
-              <a:buChar char="•"/>
-            </a:pPr>
-            <a:endParaRPr lang="pl-PL" sz="1200" kern="1200" baseline="0" dirty="0" smtClean="0">
-              <a:solidFill>
-                <a:schemeClr val="tx1"/>
-              </a:solidFill>
-              <a:latin typeface="+mn-lt"/>
-              <a:ea typeface="+mn-ea"/>
-              <a:cs typeface="+mn-cs"/>
-            </a:endParaRPr>
-          </a:p>
-          <a:p>
-            <a:pPr lvl="1">
-              <a:buFont typeface="Arial" pitchFamily="34" charset="0"/>
-              <a:buChar char="•"/>
-            </a:pPr>
-            <a:r>
-              <a:rPr lang="pl-PL" sz="1200" kern="1200" baseline="0" dirty="0" smtClean="0">
-                <a:solidFill>
-                  <a:schemeClr val="tx1"/>
-                </a:solidFill>
-                <a:latin typeface="+mn-lt"/>
-                <a:ea typeface="+mn-ea"/>
-                <a:cs typeface="+mn-cs"/>
-              </a:rPr>
-              <a:t>OpenStreetMap - </a:t>
-            </a:r>
-            <a:r>
-              <a:rPr lang="pl-PL" sz="1200" kern="1200" baseline="0" dirty="0" err="1" smtClean="0">
-                <a:solidFill>
-                  <a:schemeClr val="tx1"/>
-                </a:solidFill>
-                <a:latin typeface="+mn-lt"/>
-                <a:ea typeface="+mn-ea"/>
-                <a:cs typeface="+mn-cs"/>
-              </a:rPr>
-              <a:t>OsmDroid</a:t>
-            </a:r>
-            <a:endParaRPr lang="pl-PL" sz="1200" kern="1200" dirty="0" smtClean="0">
-              <a:solidFill>
-                <a:schemeClr val="tx1"/>
-              </a:solidFill>
-              <a:latin typeface="+mn-lt"/>
-              <a:ea typeface="+mn-ea"/>
-              <a:cs typeface="+mn-cs"/>
-            </a:endParaRPr>
-          </a:p>
         </p:txBody>
       </p:sp>
       <p:sp>
@@ -3297,121 +3370,6 @@
               <a:rPr lang="pl-PL" smtClean="0"/>
               <a:pPr/>
               <a:t>25</a:t>
-            </a:fld>
-            <a:endParaRPr lang="pl-PL"/>
-          </a:p>
-        </p:txBody>
-      </p:sp>
-    </p:spTree>
-  </p:cSld>
-  <p:clrMapOvr>
-    <a:masterClrMapping/>
-  </p:clrMapOvr>
-</p:notes>
-</file>
-
-<file path=ppt/notesSlides/notesSlide26.xml><?xml version="1.0" encoding="utf-8"?>
-<p:notes xmlns:a="http://schemas.openxmlformats.org/drawingml/2006/main" xmlns:r="http://schemas.openxmlformats.org/officeDocument/2006/relationships" xmlns:p="http://schemas.openxmlformats.org/presentationml/2006/main">
-  <p:cSld>
-    <p:spTree>
-      <p:nvGrpSpPr>
-        <p:cNvPr id="1" name=""/>
-        <p:cNvGrpSpPr/>
-        <p:nvPr/>
-      </p:nvGrpSpPr>
-      <p:grpSpPr>
-        <a:xfrm>
-          <a:off x="0" y="0"/>
-          <a:ext cx="0" cy="0"/>
-          <a:chOff x="0" y="0"/>
-          <a:chExt cx="0" cy="0"/>
-        </a:xfrm>
-      </p:grpSpPr>
-      <p:sp>
-        <p:nvSpPr>
-          <p:cNvPr id="2" name="Symbol zastępczy obrazu slajdu 1"/>
-          <p:cNvSpPr>
-            <a:spLocks noGrp="1" noRot="1" noChangeAspect="1"/>
-          </p:cNvSpPr>
-          <p:nvPr>
-            <p:ph type="sldImg"/>
-          </p:nvPr>
-        </p:nvSpPr>
-        <p:spPr/>
-      </p:sp>
-      <p:sp>
-        <p:nvSpPr>
-          <p:cNvPr id="3" name="Symbol zastępczy notatek 2"/>
-          <p:cNvSpPr>
-            <a:spLocks noGrp="1"/>
-          </p:cNvSpPr>
-          <p:nvPr>
-            <p:ph type="body" idx="1"/>
-          </p:nvPr>
-        </p:nvSpPr>
-        <p:spPr/>
-        <p:txBody>
-          <a:bodyPr>
-            <a:normAutofit/>
-          </a:bodyPr>
-          <a:lstStyle/>
-          <a:p>
-            <a:pPr>
-              <a:buFont typeface="Arial" pitchFamily="34" charset="0"/>
-              <a:buChar char="•"/>
-            </a:pPr>
-            <a:r>
-              <a:rPr lang="pl-PL" sz="1200" kern="1200" baseline="0" dirty="0" smtClean="0">
-                <a:solidFill>
-                  <a:schemeClr val="tx1"/>
-                </a:solidFill>
-                <a:latin typeface="+mn-lt"/>
-                <a:ea typeface="+mn-ea"/>
-                <a:cs typeface="+mn-cs"/>
-              </a:rPr>
-              <a:t> działanie aplikacji </a:t>
-            </a:r>
-            <a:r>
-              <a:rPr lang="pl-PL" sz="1200" kern="1200" baseline="0" dirty="0" err="1" smtClean="0">
-                <a:solidFill>
-                  <a:schemeClr val="tx1"/>
-                </a:solidFill>
-                <a:latin typeface="+mn-lt"/>
-                <a:ea typeface="+mn-ea"/>
-                <a:cs typeface="+mn-cs"/>
-              </a:rPr>
-              <a:t>DronVision</a:t>
-            </a:r>
-            <a:endParaRPr lang="pl-PL" sz="1200" kern="1200" dirty="0">
-              <a:solidFill>
-                <a:schemeClr val="tx1"/>
-              </a:solidFill>
-              <a:latin typeface="+mn-lt"/>
-              <a:ea typeface="+mn-ea"/>
-              <a:cs typeface="+mn-cs"/>
-            </a:endParaRPr>
-          </a:p>
-        </p:txBody>
-      </p:sp>
-      <p:sp>
-        <p:nvSpPr>
-          <p:cNvPr id="4" name="Symbol zastępczy numeru slajdu 3"/>
-          <p:cNvSpPr>
-            <a:spLocks noGrp="1"/>
-          </p:cNvSpPr>
-          <p:nvPr>
-            <p:ph type="sldNum" sz="quarter" idx="10"/>
-          </p:nvPr>
-        </p:nvSpPr>
-        <p:spPr/>
-        <p:txBody>
-          <a:bodyPr/>
-          <a:lstStyle/>
-          <a:p>
-            <a:fld id="{A221A992-22D9-4EF5-B468-BF47D09055D6}" type="slidenum">
-              <a:rPr lang="pl-PL" smtClean="0"/>
-              <a:pPr/>
-              <a:t>26</a:t>
             </a:fld>
             <a:endParaRPr lang="pl-PL"/>
           </a:p>
@@ -3616,35 +3574,19 @@
                 <a:ea typeface="+mn-ea"/>
                 <a:cs typeface="+mn-cs"/>
               </a:rPr>
-              <a:t> powierzchni geoidy.</a:t>
-            </a:r>
-            <a:endParaRPr lang="pl-PL" sz="1200" kern="1200" dirty="0" smtClean="0">
-              <a:solidFill>
-                <a:schemeClr val="tx1"/>
-              </a:solidFill>
-              <a:latin typeface="+mn-lt"/>
-              <a:ea typeface="+mn-ea"/>
-              <a:cs typeface="+mn-cs"/>
-            </a:endParaRPr>
-          </a:p>
-          <a:p>
-            <a:pPr marL="0" marR="0" indent="0" algn="l" defTabSz="914400" rtl="0" eaLnBrk="1" fontAlgn="auto" latinLnBrk="0" hangingPunct="1">
-              <a:lnSpc>
-                <a:spcPct val="100000"/>
-              </a:lnSpc>
-              <a:spcBef>
-                <a:spcPts val="0"/>
-              </a:spcBef>
-              <a:spcAft>
-                <a:spcPts val="0"/>
-              </a:spcAft>
-              <a:buClrTx/>
-              <a:buSzTx/>
-              <a:buFont typeface="Arial" pitchFamily="34" charset="0"/>
-              <a:buChar char="•"/>
-              <a:tabLst/>
-              <a:defRPr/>
-            </a:pPr>
+              <a:t> powierzchni geoidy</a:t>
+            </a:r>
+            <a:r>
+              <a:rPr lang="pl-PL" sz="1200" kern="1200" baseline="0" dirty="0" smtClean="0">
+                <a:solidFill>
+                  <a:schemeClr val="tx1"/>
+                </a:solidFill>
+                <a:latin typeface="+mn-lt"/>
+                <a:ea typeface="+mn-ea"/>
+                <a:cs typeface="+mn-cs"/>
+              </a:rPr>
+              <a:t>.</a:t>
+            </a:r>
             <a:endParaRPr lang="pl-PL" sz="1200" kern="1200" dirty="0" smtClean="0">
               <a:solidFill>
                 <a:schemeClr val="tx1"/>
@@ -4209,14 +4151,12 @@
             </a:pPr>
             <a:r>
               <a:rPr lang="pl-PL" baseline="0" dirty="0" smtClean="0"/>
-              <a:t> Pierwsze dwie heurystyka, trzeci – naukowa teoria kształtu alfa,</a:t>
-            </a:r>
-          </a:p>
-          <a:p>
-            <a:pPr>
-              <a:buFont typeface="Arial" pitchFamily="34" charset="0"/>
-              <a:buChar char="•"/>
-            </a:pPr>
+              <a:t> Pierwsze dwie heurystyka, trzeci – naukowa teoria kształtu alfa</a:t>
+            </a:r>
+            <a:r>
+              <a:rPr lang="pl-PL" baseline="0" dirty="0" smtClean="0"/>
+              <a:t>,</a:t>
+            </a:r>
             <a:endParaRPr lang="pl-PL" baseline="0" dirty="0" smtClean="0"/>
           </a:p>
           <a:p>
@@ -4401,7 +4341,7 @@
               <a:t> Wyznaczanie kolejnych </a:t>
             </a:r>
             <a:r>
-              <a:rPr lang="pl-PL" sz="1200" kern="1200" baseline="0" dirty="0" err="1" smtClean="0">
+              <a:rPr lang="pl-PL" sz="1200" kern="1200" baseline="0" dirty="0" smtClean="0">
                 <a:solidFill>
                   <a:schemeClr val="tx1"/>
                 </a:solidFill>
@@ -4409,7 +4349,7 @@
                 <a:ea typeface="+mn-ea"/>
                 <a:cs typeface="+mn-cs"/>
               </a:rPr>
-              <a:t>okręsów</a:t>
+              <a:t>okręgów </a:t>
             </a:r>
             <a:r>
               <a:rPr lang="pl-PL" sz="1200" kern="1200" baseline="0" dirty="0" smtClean="0">
@@ -4420,7 +4360,7 @@
                 <a:ea typeface="+mn-ea"/>
                 <a:cs typeface="+mn-cs"/>
               </a:rPr>
-              <a:t> od wysokości </a:t>
+              <a:t>od wysokości </a:t>
             </a:r>
             <a:r>
               <a:rPr lang="pl-PL" sz="1200" kern="1200" baseline="0" dirty="0" err="1" smtClean="0">
@@ -4714,10 +4654,10 @@
                 <a:ea typeface="+mn-ea"/>
                 <a:cs typeface="+mn-cs"/>
               </a:rPr>
-              <a:t> Fragmenty o mniejszym promieniu – większa </a:t>
-            </a:r>
-            <a:r>
-              <a:rPr lang="pl-PL" sz="1200" kern="1200" baseline="0" dirty="0" err="1" smtClean="0">
+              <a:t> Fragmenty o mniejszym promieniu – </a:t>
+            </a:r>
+            <a:r>
+              <a:rPr lang="pl-PL" sz="1200" kern="1200" baseline="0" dirty="0" smtClean="0">
                 <a:solidFill>
                   <a:schemeClr val="tx1"/>
                 </a:solidFill>
@@ -4725,19 +4665,16 @@
                 <a:ea typeface="+mn-ea"/>
                 <a:cs typeface="+mn-cs"/>
               </a:rPr>
-              <a:t>wyokość</a:t>
-            </a:r>
-            <a:r>
-              <a:rPr lang="pl-PL" sz="1200" kern="1200" baseline="0" dirty="0" smtClean="0">
-                <a:solidFill>
-                  <a:schemeClr val="tx1"/>
-                </a:solidFill>
-                <a:latin typeface="+mn-lt"/>
-                <a:ea typeface="+mn-ea"/>
-                <a:cs typeface="+mn-cs"/>
-              </a:rPr>
-              <a:t>,</a:t>
-            </a:r>
+              <a:t>większa wysokość</a:t>
+            </a:r>
+            <a:endParaRPr lang="pl-PL" sz="1200" kern="1200" baseline="0" dirty="0" smtClean="0">
+              <a:solidFill>
+                <a:schemeClr val="tx1"/>
+              </a:solidFill>
+              <a:latin typeface="+mn-lt"/>
+              <a:ea typeface="+mn-ea"/>
+              <a:cs typeface="+mn-cs"/>
+            </a:endParaRPr>
           </a:p>
           <a:p>
             <a:pPr>
@@ -4753,14 +4690,19 @@
                 <a:ea typeface="+mn-ea"/>
                 <a:cs typeface="+mn-cs"/>
               </a:rPr>
-              <a:t> o mniejszym – mniejsza,</a:t>
-            </a:r>
-          </a:p>
-          <a:p>
-            <a:pPr>
-              <a:buFont typeface="Arial" pitchFamily="34" charset="0"/>
-              <a:buChar char="•"/>
-            </a:pPr>
+              <a:t> o mniejszym – mniejsza</a:t>
+            </a:r>
+            <a:r>
+              <a:rPr lang="pl-PL" sz="1200" kern="1200" baseline="0" dirty="0" smtClean="0">
+                <a:solidFill>
+                  <a:schemeClr val="tx1"/>
+                </a:solidFill>
+                <a:latin typeface="+mn-lt"/>
+                <a:ea typeface="+mn-ea"/>
+                <a:cs typeface="+mn-cs"/>
+              </a:rPr>
+              <a:t>,</a:t>
+            </a:r>
             <a:endParaRPr lang="pl-PL" sz="1200" kern="1200" baseline="0" dirty="0" smtClean="0">
               <a:solidFill>
                 <a:schemeClr val="tx1"/>
@@ -5011,7 +4953,7 @@
             <a:fld id="{26454A93-E770-450C-BF74-798E16E1408D}" type="datetimeFigureOut">
               <a:rPr lang="pl-PL" smtClean="0"/>
               <a:pPr/>
-              <a:t>2016-05-19</a:t>
+              <a:t>2016-05-24</a:t>
             </a:fld>
             <a:endParaRPr lang="pl-PL"/>
           </a:p>
@@ -5178,7 +5120,7 @@
             <a:fld id="{26454A93-E770-450C-BF74-798E16E1408D}" type="datetimeFigureOut">
               <a:rPr lang="pl-PL" smtClean="0"/>
               <a:pPr/>
-              <a:t>2016-05-19</a:t>
+              <a:t>2016-05-24</a:t>
             </a:fld>
             <a:endParaRPr lang="pl-PL"/>
           </a:p>
@@ -5355,7 +5297,7 @@
             <a:fld id="{26454A93-E770-450C-BF74-798E16E1408D}" type="datetimeFigureOut">
               <a:rPr lang="pl-PL" smtClean="0"/>
               <a:pPr/>
-              <a:t>2016-05-19</a:t>
+              <a:t>2016-05-24</a:t>
             </a:fld>
             <a:endParaRPr lang="pl-PL"/>
           </a:p>
@@ -5522,7 +5464,7 @@
             <a:fld id="{26454A93-E770-450C-BF74-798E16E1408D}" type="datetimeFigureOut">
               <a:rPr lang="pl-PL" smtClean="0"/>
               <a:pPr/>
-              <a:t>2016-05-19</a:t>
+              <a:t>2016-05-24</a:t>
             </a:fld>
             <a:endParaRPr lang="pl-PL"/>
           </a:p>
@@ -5765,7 +5707,7 @@
             <a:fld id="{26454A93-E770-450C-BF74-798E16E1408D}" type="datetimeFigureOut">
               <a:rPr lang="pl-PL" smtClean="0"/>
               <a:pPr/>
-              <a:t>2016-05-19</a:t>
+              <a:t>2016-05-24</a:t>
             </a:fld>
             <a:endParaRPr lang="pl-PL"/>
           </a:p>
@@ -6050,7 +5992,7 @@
             <a:fld id="{26454A93-E770-450C-BF74-798E16E1408D}" type="datetimeFigureOut">
               <a:rPr lang="pl-PL" smtClean="0"/>
               <a:pPr/>
-              <a:t>2016-05-19</a:t>
+              <a:t>2016-05-24</a:t>
             </a:fld>
             <a:endParaRPr lang="pl-PL"/>
           </a:p>
@@ -6469,7 +6411,7 @@
             <a:fld id="{26454A93-E770-450C-BF74-798E16E1408D}" type="datetimeFigureOut">
               <a:rPr lang="pl-PL" smtClean="0"/>
               <a:pPr/>
-              <a:t>2016-05-19</a:t>
+              <a:t>2016-05-24</a:t>
             </a:fld>
             <a:endParaRPr lang="pl-PL"/>
           </a:p>
@@ -6584,7 +6526,7 @@
             <a:fld id="{26454A93-E770-450C-BF74-798E16E1408D}" type="datetimeFigureOut">
               <a:rPr lang="pl-PL" smtClean="0"/>
               <a:pPr/>
-              <a:t>2016-05-19</a:t>
+              <a:t>2016-05-24</a:t>
             </a:fld>
             <a:endParaRPr lang="pl-PL"/>
           </a:p>
@@ -6676,7 +6618,7 @@
             <a:fld id="{26454A93-E770-450C-BF74-798E16E1408D}" type="datetimeFigureOut">
               <a:rPr lang="pl-PL" smtClean="0"/>
               <a:pPr/>
-              <a:t>2016-05-19</a:t>
+              <a:t>2016-05-24</a:t>
             </a:fld>
             <a:endParaRPr lang="pl-PL"/>
           </a:p>
@@ -6950,7 +6892,7 @@
             <a:fld id="{26454A93-E770-450C-BF74-798E16E1408D}" type="datetimeFigureOut">
               <a:rPr lang="pl-PL" smtClean="0"/>
               <a:pPr/>
-              <a:t>2016-05-19</a:t>
+              <a:t>2016-05-24</a:t>
             </a:fld>
             <a:endParaRPr lang="pl-PL"/>
           </a:p>
@@ -7200,7 +7142,7 @@
             <a:fld id="{26454A93-E770-450C-BF74-798E16E1408D}" type="datetimeFigureOut">
               <a:rPr lang="pl-PL" smtClean="0"/>
               <a:pPr/>
-              <a:t>2016-05-19</a:t>
+              <a:t>2016-05-24</a:t>
             </a:fld>
             <a:endParaRPr lang="pl-PL"/>
           </a:p>
@@ -7429,7 +7371,7 @@
             <a:fld id="{26454A93-E770-450C-BF74-798E16E1408D}" type="datetimeFigureOut">
               <a:rPr lang="pl-PL" smtClean="0"/>
               <a:pPr/>
-              <a:t>2016-05-19</a:t>
+              <a:t>2016-05-24</a:t>
             </a:fld>
             <a:endParaRPr lang="pl-PL"/>
           </a:p>
@@ -8483,7 +8425,12 @@
             <p:ph type="title"/>
           </p:nvPr>
         </p:nvSpPr>
-        <p:spPr/>
+        <p:spPr>
+          <a:xfrm>
+            <a:off x="467544" y="0"/>
+            <a:ext cx="8229600" cy="1143000"/>
+          </a:xfrm>
+        </p:spPr>
         <p:txBody>
           <a:bodyPr>
             <a:normAutofit/>
@@ -8510,8 +8457,8 @@
         </p:nvSpPr>
         <p:spPr>
           <a:xfrm>
-            <a:off x="467544" y="1484784"/>
-            <a:ext cx="8229600" cy="4525963"/>
+            <a:off x="0" y="1124745"/>
+            <a:ext cx="4644008" cy="1944216"/>
           </a:xfrm>
         </p:spPr>
         <p:txBody>
@@ -8520,47 +8467,50 @@
           </a:bodyPr>
           <a:lstStyle/>
           <a:p>
-            <a:r>
-              <a:rPr lang="pl-PL" sz="2500" b="1" dirty="0" smtClean="0"/>
-              <a:t>Kształt </a:t>
-            </a:r>
-            <a:r>
-              <a:rPr lang="el-GR" sz="2500" b="1" dirty="0" smtClean="0"/>
+            <a:pPr>
+              <a:buNone/>
+            </a:pPr>
+            <a:r>
+              <a:rPr lang="pl-PL" sz="2000" b="1" dirty="0" smtClean="0"/>
+              <a:t>	Kształt </a:t>
+            </a:r>
+            <a:r>
+              <a:rPr lang="el-GR" sz="2000" b="1" dirty="0" smtClean="0"/>
               <a:t>α</a:t>
             </a:r>
             <a:r>
-              <a:rPr lang="pl-PL" sz="2500" b="1" dirty="0" smtClean="0"/>
+              <a:rPr lang="pl-PL" sz="2000" b="1" dirty="0" smtClean="0"/>
               <a:t> </a:t>
             </a:r>
             <a:r>
-              <a:rPr lang="pl-PL" sz="2500" dirty="0" smtClean="0"/>
+              <a:rPr lang="pl-PL" sz="2000" dirty="0" smtClean="0"/>
               <a:t>dowolnego zbioru punktów jest </a:t>
             </a:r>
             <a:r>
-              <a:rPr lang="pl-PL" sz="2500" dirty="0" err="1" smtClean="0"/>
+              <a:rPr lang="pl-PL" sz="2000" dirty="0" err="1" smtClean="0"/>
               <a:t>subgrafem</a:t>
             </a:r>
             <a:r>
-              <a:rPr lang="pl-PL" sz="2500" dirty="0" smtClean="0"/>
+              <a:rPr lang="pl-PL" sz="2000" dirty="0" smtClean="0"/>
               <a:t> triangulacji </a:t>
             </a:r>
             <a:r>
-              <a:rPr lang="pl-PL" sz="2500" dirty="0" err="1" smtClean="0"/>
+              <a:rPr lang="pl-PL" sz="2000" dirty="0" err="1" smtClean="0"/>
               <a:t>Delaunay</a:t>
             </a:r>
             <a:r>
-              <a:rPr lang="pl-PL" sz="2500" dirty="0" smtClean="0"/>
+              <a:rPr lang="pl-PL" sz="2000" dirty="0" smtClean="0"/>
               <a:t> takim, że dwa punkty stanowią jego krawędź jeśli istnieje pusta kula o promieniu 1/</a:t>
             </a:r>
             <a:r>
-              <a:rPr lang="el-GR" sz="2500" dirty="0" smtClean="0"/>
+              <a:rPr lang="el-GR" sz="2000" dirty="0" smtClean="0"/>
               <a:t>α</a:t>
             </a:r>
             <a:r>
-              <a:rPr lang="pl-PL" sz="2500" dirty="0" smtClean="0"/>
+              <a:rPr lang="pl-PL" sz="2000" dirty="0" smtClean="0"/>
               <a:t> stykająca się z tymi dwoma punktami. </a:t>
             </a:r>
-            <a:endParaRPr lang="pl-PL" sz="2500" dirty="0"/>
+            <a:endParaRPr lang="pl-PL" sz="2000" dirty="0"/>
           </a:p>
         </p:txBody>
       </p:sp>
@@ -8579,8 +8529,8 @@
         </p:blipFill>
         <p:spPr bwMode="auto">
           <a:xfrm>
-            <a:off x="1979712" y="3429000"/>
-            <a:ext cx="5400600" cy="2950510"/>
+            <a:off x="4427984" y="1052736"/>
+            <a:ext cx="4464496" cy="2520280"/>
           </a:xfrm>
           <a:prstGeom prst="rect">
             <a:avLst/>
@@ -8594,75 +8544,9 @@
           </a:ln>
         </p:spPr>
       </p:pic>
-    </p:spTree>
-  </p:cSld>
-  <p:clrMapOvr>
-    <a:masterClrMapping/>
-  </p:clrMapOvr>
-  <p:timing>
-    <p:tnLst>
-      <p:par>
-        <p:cTn id="1" dur="indefinite" restart="never" nodeType="tmRoot"/>
-      </p:par>
-    </p:tnLst>
-  </p:timing>
-</p:sld>
-</file>
-
-<file path=ppt/slides/slide16.xml><?xml version="1.0" encoding="utf-8"?>
-<p:sld xmlns:a="http://schemas.openxmlformats.org/drawingml/2006/main" xmlns:r="http://schemas.openxmlformats.org/officeDocument/2006/relationships" xmlns:p="http://schemas.openxmlformats.org/presentationml/2006/main">
-  <p:cSld>
-    <p:spTree>
-      <p:nvGrpSpPr>
-        <p:cNvPr id="1" name=""/>
-        <p:cNvGrpSpPr/>
-        <p:nvPr/>
-      </p:nvGrpSpPr>
-      <p:grpSpPr>
-        <a:xfrm>
-          <a:off x="0" y="0"/>
-          <a:ext cx="0" cy="0"/>
-          <a:chOff x="0" y="0"/>
-          <a:chExt cx="0" cy="0"/>
-        </a:xfrm>
-      </p:grpSpPr>
-      <p:sp>
-        <p:nvSpPr>
-          <p:cNvPr id="2" name="Tytuł 1"/>
-          <p:cNvSpPr>
-            <a:spLocks noGrp="1"/>
-          </p:cNvSpPr>
-          <p:nvPr>
-            <p:ph type="title"/>
-          </p:nvPr>
-        </p:nvSpPr>
-        <p:spPr>
-          <a:xfrm>
-            <a:off x="467544" y="0"/>
-            <a:ext cx="8229600" cy="1143000"/>
-          </a:xfrm>
-        </p:spPr>
-        <p:txBody>
-          <a:bodyPr>
-            <a:normAutofit/>
-          </a:bodyPr>
-          <a:lstStyle/>
-          <a:p>
-            <a:r>
-              <a:rPr lang="pl-PL" sz="3500" b="1" dirty="0" smtClean="0"/>
-              <a:t>Triangulacja </a:t>
-            </a:r>
-            <a:r>
-              <a:rPr lang="pl-PL" sz="3500" b="1" dirty="0" err="1" smtClean="0"/>
-              <a:t>Delaunay</a:t>
-            </a:r>
-            <a:endParaRPr lang="pl-PL" sz="3500" b="1" dirty="0"/>
-          </a:p>
-        </p:txBody>
-      </p:sp>
-      <p:sp>
-        <p:nvSpPr>
-          <p:cNvPr id="3075" name="Rectangle 3"/>
+      <p:sp>
+        <p:nvSpPr>
+          <p:cNvPr id="5" name="Rectangle 3"/>
           <p:cNvSpPr>
             <a:spLocks noChangeArrowheads="1"/>
           </p:cNvSpPr>
@@ -8670,7 +8554,7 @@
         </p:nvSpPr>
         <p:spPr bwMode="auto">
           <a:xfrm>
-            <a:off x="0" y="2276872"/>
+            <a:off x="3923928" y="3897052"/>
             <a:ext cx="4896544" cy="2246769"/>
           </a:xfrm>
           <a:prstGeom prst="rect">
@@ -8719,7 +8603,7 @@
                   <a:schemeClr val="tx1"/>
                 </a:solidFill>
                 <a:effectLst/>
-                <a:latin typeface="Arial" pitchFamily="34" charset="0"/>
+                <a:latin typeface="+mj-lt"/>
                 <a:ea typeface="Calibri" pitchFamily="34" charset="0"/>
                 <a:cs typeface="Times New Roman" pitchFamily="18" charset="0"/>
               </a:rPr>
@@ -8734,7 +8618,7 @@
                   <a:schemeClr val="tx1"/>
                 </a:solidFill>
                 <a:effectLst/>
-                <a:latin typeface="Arial" pitchFamily="34" charset="0"/>
+                <a:latin typeface="+mj-lt"/>
                 <a:ea typeface="Calibri" pitchFamily="34" charset="0"/>
                 <a:cs typeface="Times New Roman" pitchFamily="18" charset="0"/>
               </a:rPr>
@@ -8749,7 +8633,7 @@
                   <a:schemeClr val="tx1"/>
                 </a:solidFill>
                 <a:effectLst/>
-                <a:latin typeface="Arial" pitchFamily="34" charset="0"/>
+                <a:latin typeface="+mj-lt"/>
                 <a:ea typeface="Calibri" pitchFamily="34" charset="0"/>
                 <a:cs typeface="Times New Roman" pitchFamily="18" charset="0"/>
               </a:rPr>
@@ -8764,7 +8648,7 @@
                   <a:schemeClr val="tx1"/>
                 </a:solidFill>
                 <a:effectLst/>
-                <a:latin typeface="Arial" pitchFamily="34" charset="0"/>
+                <a:latin typeface="+mj-lt"/>
                 <a:ea typeface="Calibri" pitchFamily="34" charset="0"/>
                 <a:cs typeface="Times New Roman" pitchFamily="18" charset="0"/>
               </a:rPr>
@@ -8779,7 +8663,7 @@
                   <a:schemeClr val="tx1"/>
                 </a:solidFill>
                 <a:effectLst/>
-                <a:latin typeface="Arial" pitchFamily="34" charset="0"/>
+                <a:latin typeface="+mj-lt"/>
                 <a:ea typeface="Calibri" pitchFamily="34" charset="0"/>
                 <a:cs typeface="Times New Roman" pitchFamily="18" charset="0"/>
               </a:rPr>
@@ -8793,7 +8677,7 @@
                 <a:schemeClr val="tx1"/>
               </a:solidFill>
               <a:effectLst/>
-              <a:latin typeface="Arial" pitchFamily="34" charset="0"/>
+              <a:latin typeface="+mj-lt"/>
               <a:cs typeface="Arial" pitchFamily="34" charset="0"/>
             </a:endParaRPr>
           </a:p>
@@ -8801,14 +8685,14 @@
       </p:sp>
       <p:pic>
         <p:nvPicPr>
-          <p:cNvPr id="3074" name="Picture 2" descr="https://upload.wikimedia.org/wikipedia/commons/thumb/d/db/Delaunay_circumcircles_vectorial.svg/500px-Delaunay_circumcircles_vectorial.svg.png"/>
+          <p:cNvPr id="6" name="Picture 2" descr="https://upload.wikimedia.org/wikipedia/commons/thumb/d/db/Delaunay_circumcircles_vectorial.svg/500px-Delaunay_circumcircles_vectorial.svg.png"/>
           <p:cNvPicPr>
             <a:picLocks noChangeAspect="1" noChangeArrowheads="1"/>
           </p:cNvPicPr>
           <p:nvPr/>
         </p:nvPicPr>
         <p:blipFill>
-          <a:blip r:embed="rId3" cstate="print"/>
+          <a:blip r:embed="rId4" cstate="print"/>
           <a:srcRect/>
           <a:stretch>
             <a:fillRect/>
@@ -8816,8 +8700,8 @@
         </p:blipFill>
         <p:spPr bwMode="auto">
           <a:xfrm>
-            <a:off x="4932040" y="1268760"/>
-            <a:ext cx="4427984" cy="4536504"/>
+            <a:off x="323528" y="3501008"/>
+            <a:ext cx="3022275" cy="3096344"/>
           </a:xfrm>
           <a:prstGeom prst="rect">
             <a:avLst/>
@@ -8840,7 +8724,7 @@
 </p:sld>
 </file>
 
-<file path=ppt/slides/slide17.xml><?xml version="1.0" encoding="utf-8"?>
+<file path=ppt/slides/slide16.xml><?xml version="1.0" encoding="utf-8"?>
 <p:sld xmlns:a="http://schemas.openxmlformats.org/drawingml/2006/main" xmlns:r="http://schemas.openxmlformats.org/officeDocument/2006/relationships" xmlns:p="http://schemas.openxmlformats.org/presentationml/2006/main">
   <p:cSld>
     <p:spTree>
@@ -8932,6 +8816,185 @@
 </p:sld>
 </file>
 
+<file path=ppt/slides/slide17.xml><?xml version="1.0" encoding="utf-8"?>
+<p:sld xmlns:a="http://schemas.openxmlformats.org/drawingml/2006/main" xmlns:r="http://schemas.openxmlformats.org/officeDocument/2006/relationships" xmlns:p="http://schemas.openxmlformats.org/presentationml/2006/main">
+  <p:cSld>
+    <p:spTree>
+      <p:nvGrpSpPr>
+        <p:cNvPr id="1" name=""/>
+        <p:cNvGrpSpPr/>
+        <p:nvPr/>
+      </p:nvGrpSpPr>
+      <p:grpSpPr>
+        <a:xfrm>
+          <a:off x="0" y="0"/>
+          <a:ext cx="0" cy="0"/>
+          <a:chOff x="0" y="0"/>
+          <a:chExt cx="0" cy="0"/>
+        </a:xfrm>
+      </p:grpSpPr>
+      <p:sp>
+        <p:nvSpPr>
+          <p:cNvPr id="2" name="Tytuł 1"/>
+          <p:cNvSpPr>
+            <a:spLocks noGrp="1"/>
+          </p:cNvSpPr>
+          <p:nvPr>
+            <p:ph type="title"/>
+          </p:nvPr>
+        </p:nvSpPr>
+        <p:spPr>
+          <a:xfrm>
+            <a:off x="467544" y="0"/>
+            <a:ext cx="8229600" cy="1143000"/>
+          </a:xfrm>
+        </p:spPr>
+        <p:txBody>
+          <a:bodyPr>
+            <a:normAutofit/>
+          </a:bodyPr>
+          <a:lstStyle/>
+          <a:p>
+            <a:r>
+              <a:rPr lang="pl-PL" sz="3500" b="1" dirty="0" smtClean="0"/>
+              <a:t>Algorytm w praktyce</a:t>
+            </a:r>
+            <a:endParaRPr lang="pl-PL" sz="3500" b="1" dirty="0"/>
+          </a:p>
+        </p:txBody>
+      </p:sp>
+      <p:sp>
+        <p:nvSpPr>
+          <p:cNvPr id="3" name="Symbol zastępczy zawartości 2"/>
+          <p:cNvSpPr>
+            <a:spLocks noGrp="1"/>
+          </p:cNvSpPr>
+          <p:nvPr>
+            <p:ph idx="1"/>
+          </p:nvPr>
+        </p:nvSpPr>
+        <p:spPr>
+          <a:xfrm>
+            <a:off x="395536" y="1772816"/>
+            <a:ext cx="8229600" cy="4525963"/>
+          </a:xfrm>
+        </p:spPr>
+        <p:txBody>
+          <a:bodyPr>
+            <a:normAutofit/>
+          </a:bodyPr>
+          <a:lstStyle/>
+          <a:p>
+            <a:pPr marL="514350" indent="-514350">
+              <a:buFont typeface="+mj-lt"/>
+              <a:buAutoNum type="arabicPeriod"/>
+            </a:pPr>
+            <a:r>
+              <a:rPr lang="pl-PL" sz="2500" dirty="0" err="1" smtClean="0"/>
+              <a:t>Densyfikacja</a:t>
+            </a:r>
+            <a:r>
+              <a:rPr lang="pl-PL" sz="2500" dirty="0" smtClean="0"/>
+              <a:t> punktów należących do obu zbiorów,</a:t>
+            </a:r>
+          </a:p>
+          <a:p>
+            <a:pPr marL="514350" indent="-514350">
+              <a:buFont typeface="+mj-lt"/>
+              <a:buAutoNum type="arabicPeriod"/>
+            </a:pPr>
+            <a:endParaRPr lang="pl-PL" sz="1500" dirty="0" smtClean="0"/>
+          </a:p>
+          <a:p>
+            <a:pPr marL="514350" indent="-514350">
+              <a:buFont typeface="+mj-lt"/>
+              <a:buAutoNum type="arabicPeriod"/>
+            </a:pPr>
+            <a:r>
+              <a:rPr lang="pl-PL" sz="2500" dirty="0" smtClean="0"/>
+              <a:t>Połączenie zbiorów w jeden zbiór </a:t>
+            </a:r>
+            <a:r>
+              <a:rPr lang="pl-PL" sz="2500" b="1" dirty="0" smtClean="0"/>
+              <a:t>P</a:t>
+            </a:r>
+            <a:r>
+              <a:rPr lang="pl-PL" sz="2500" dirty="0" smtClean="0"/>
+              <a:t>,</a:t>
+            </a:r>
+          </a:p>
+          <a:p>
+            <a:pPr marL="514350" indent="-514350">
+              <a:buFont typeface="+mj-lt"/>
+              <a:buAutoNum type="arabicPeriod"/>
+            </a:pPr>
+            <a:endParaRPr lang="pl-PL" sz="1500" dirty="0" smtClean="0"/>
+          </a:p>
+          <a:p>
+            <a:pPr marL="514350" indent="-514350">
+              <a:buFont typeface="+mj-lt"/>
+              <a:buAutoNum type="arabicPeriod"/>
+            </a:pPr>
+            <a:r>
+              <a:rPr lang="pl-PL" sz="2500" dirty="0" smtClean="0"/>
+              <a:t>Triangulacja </a:t>
+            </a:r>
+            <a:r>
+              <a:rPr lang="pl-PL" sz="2500" dirty="0" err="1" smtClean="0"/>
+              <a:t>Delaunay</a:t>
+            </a:r>
+            <a:r>
+              <a:rPr lang="pl-PL" sz="2500" dirty="0" smtClean="0"/>
+              <a:t> na zbiorze </a:t>
+            </a:r>
+            <a:r>
+              <a:rPr lang="pl-PL" sz="2500" b="1" dirty="0" smtClean="0"/>
+              <a:t>P</a:t>
+            </a:r>
+            <a:r>
+              <a:rPr lang="pl-PL" sz="2500" dirty="0" smtClean="0"/>
+              <a:t>,</a:t>
+            </a:r>
+          </a:p>
+          <a:p>
+            <a:pPr marL="514350" indent="-514350">
+              <a:buFont typeface="+mj-lt"/>
+              <a:buAutoNum type="arabicPeriod"/>
+            </a:pPr>
+            <a:endParaRPr lang="pl-PL" sz="1500" dirty="0" smtClean="0"/>
+          </a:p>
+          <a:p>
+            <a:pPr marL="514350" indent="-514350">
+              <a:buFont typeface="+mj-lt"/>
+              <a:buAutoNum type="arabicPeriod"/>
+            </a:pPr>
+            <a:r>
+              <a:rPr lang="pl-PL" sz="2500" dirty="0" smtClean="0"/>
+              <a:t>Wyznaczenie grafu reprezentującego otoczkę poprzez połączenie trójkątów, dla których promień okręgu na nich opisanego jest mniejszy od dobranej wartości parametru </a:t>
+            </a:r>
+            <a:r>
+              <a:rPr lang="el-GR" sz="2500" b="1" dirty="0" smtClean="0"/>
+              <a:t>α</a:t>
+            </a:r>
+            <a:endParaRPr lang="pl-PL" sz="2500" b="1" dirty="0" smtClean="0"/>
+          </a:p>
+        </p:txBody>
+      </p:sp>
+    </p:spTree>
+  </p:cSld>
+  <p:clrMapOvr>
+    <a:masterClrMapping/>
+  </p:clrMapOvr>
+  <p:timing>
+    <p:tnLst>
+      <p:par>
+        <p:cTn id="1" dur="indefinite" restart="never" nodeType="tmRoot"/>
+      </p:par>
+    </p:tnLst>
+  </p:timing>
+</p:sld>
+</file>
+
 <file path=ppt/slides/slide18.xml><?xml version="1.0" encoding="utf-8"?>
 <p:sld xmlns:a="http://schemas.openxmlformats.org/drawingml/2006/main" xmlns:r="http://schemas.openxmlformats.org/officeDocument/2006/relationships" xmlns:p="http://schemas.openxmlformats.org/presentationml/2006/main">
   <p:cSld>
@@ -8973,129 +9036,34 @@
           <a:p>
             <a:r>
               <a:rPr lang="pl-PL" sz="3500" b="1" dirty="0" smtClean="0"/>
-              <a:t>Algorytm w praktyce</a:t>
+              <a:t>Przykładowy zbiór punktów P</a:t>
             </a:r>
             <a:endParaRPr lang="pl-PL" sz="3500" b="1" dirty="0"/>
           </a:p>
         </p:txBody>
       </p:sp>
-      <p:sp>
-        <p:nvSpPr>
-          <p:cNvPr id="3" name="Symbol zastępczy zawartości 2"/>
-          <p:cNvSpPr>
-            <a:spLocks noGrp="1"/>
-          </p:cNvSpPr>
-          <p:nvPr>
-            <p:ph idx="1"/>
-          </p:nvPr>
-        </p:nvSpPr>
+      <p:pic>
+        <p:nvPicPr>
+          <p:cNvPr id="4" name="Obraz 3" descr="alpha11.jpg"/>
+          <p:cNvPicPr/>
+          <p:nvPr/>
+        </p:nvPicPr>
+        <p:blipFill>
+          <a:blip r:embed="rId3" cstate="print"/>
+          <a:stretch>
+            <a:fillRect/>
+          </a:stretch>
+        </p:blipFill>
         <p:spPr>
           <a:xfrm>
-            <a:off x="395536" y="1772816"/>
-            <a:ext cx="8229600" cy="4525963"/>
+            <a:off x="899592" y="1628800"/>
+            <a:ext cx="7560000" cy="4320000"/>
           </a:xfrm>
+          <a:prstGeom prst="rect">
+            <a:avLst/>
+          </a:prstGeom>
         </p:spPr>
-        <p:txBody>
-          <a:bodyPr>
-            <a:normAutofit/>
-          </a:bodyPr>
-          <a:lstStyle/>
-          <a:p>
-            <a:pPr marL="514350" indent="-514350">
-              <a:buFont typeface="+mj-lt"/>
-              <a:buAutoNum type="arabicPeriod"/>
-            </a:pPr>
-            <a:r>
-              <a:rPr lang="pl-PL" sz="2500" dirty="0" err="1" smtClean="0"/>
-              <a:t>Densyfikacja</a:t>
-            </a:r>
-            <a:r>
-              <a:rPr lang="pl-PL" sz="2500" dirty="0" smtClean="0"/>
-              <a:t> punktów należących do obu zbiorów,</a:t>
-            </a:r>
-          </a:p>
-          <a:p>
-            <a:pPr marL="514350" indent="-514350">
-              <a:buFont typeface="+mj-lt"/>
-              <a:buAutoNum type="arabicPeriod"/>
-            </a:pPr>
-            <a:endParaRPr lang="pl-PL" sz="1500" dirty="0" smtClean="0"/>
-          </a:p>
-          <a:p>
-            <a:pPr marL="514350" indent="-514350">
-              <a:buFont typeface="+mj-lt"/>
-              <a:buAutoNum type="arabicPeriod"/>
-            </a:pPr>
-            <a:r>
-              <a:rPr lang="pl-PL" sz="2500" dirty="0" smtClean="0"/>
-              <a:t>Połączenie zbiorów w jeden zbiór </a:t>
-            </a:r>
-            <a:r>
-              <a:rPr lang="pl-PL" sz="2500" b="1" dirty="0" smtClean="0"/>
-              <a:t>P</a:t>
-            </a:r>
-            <a:r>
-              <a:rPr lang="pl-PL" sz="2500" dirty="0" smtClean="0"/>
-              <a:t>,</a:t>
-            </a:r>
-          </a:p>
-          <a:p>
-            <a:pPr marL="514350" indent="-514350">
-              <a:buFont typeface="+mj-lt"/>
-              <a:buAutoNum type="arabicPeriod"/>
-            </a:pPr>
-            <a:endParaRPr lang="pl-PL" sz="1500" dirty="0" smtClean="0"/>
-          </a:p>
-          <a:p>
-            <a:pPr marL="514350" indent="-514350">
-              <a:buFont typeface="+mj-lt"/>
-              <a:buAutoNum type="arabicPeriod"/>
-            </a:pPr>
-            <a:r>
-              <a:rPr lang="pl-PL" sz="2500" dirty="0" smtClean="0"/>
-              <a:t>Triangulacja </a:t>
-            </a:r>
-            <a:r>
-              <a:rPr lang="pl-PL" sz="2500" dirty="0" err="1" smtClean="0"/>
-              <a:t>Delaunay</a:t>
-            </a:r>
-            <a:r>
-              <a:rPr lang="pl-PL" sz="2500" dirty="0" smtClean="0"/>
-              <a:t> na zbiorze </a:t>
-            </a:r>
-            <a:r>
-              <a:rPr lang="pl-PL" sz="2500" b="1" dirty="0" smtClean="0"/>
-              <a:t>P</a:t>
-            </a:r>
-            <a:r>
-              <a:rPr lang="pl-PL" sz="2500" dirty="0" smtClean="0"/>
-              <a:t>,</a:t>
-            </a:r>
-          </a:p>
-          <a:p>
-            <a:pPr marL="514350" indent="-514350">
-              <a:buFont typeface="+mj-lt"/>
-              <a:buAutoNum type="arabicPeriod"/>
-            </a:pPr>
-            <a:endParaRPr lang="pl-PL" sz="1500" dirty="0" smtClean="0"/>
-          </a:p>
-          <a:p>
-            <a:pPr marL="514350" indent="-514350">
-              <a:buFont typeface="+mj-lt"/>
-              <a:buAutoNum type="arabicPeriod"/>
-            </a:pPr>
-            <a:r>
-              <a:rPr lang="pl-PL" sz="2500" dirty="0" smtClean="0"/>
-              <a:t>Wyznaczenie grafu reprezentującego otoczkę poprzez połączenie trójkątów, dla których promień okręgu na nich opisanego jest mniejszy od dobranej wartości parametru </a:t>
-            </a:r>
-            <a:r>
-              <a:rPr lang="el-GR" sz="2500" b="1" dirty="0" smtClean="0"/>
-              <a:t>α</a:t>
-            </a:r>
-            <a:endParaRPr lang="pl-PL" sz="2500" b="1" dirty="0" smtClean="0"/>
-          </a:p>
-        </p:txBody>
-      </p:sp>
+      </p:pic>
     </p:spTree>
   </p:cSld>
   <p:clrMapOvr>
@@ -9152,15 +9120,34 @@
           <a:p>
             <a:r>
               <a:rPr lang="pl-PL" sz="3500" b="1" dirty="0" smtClean="0"/>
-              <a:t>Przykładowy zbiór punktów P</a:t>
+              <a:t>Otoczka wypukła dla zbioru P</a:t>
             </a:r>
             <a:endParaRPr lang="pl-PL" sz="3500" b="1" dirty="0"/>
+          </a:p>
+        </p:txBody>
+      </p:sp>
+      <p:sp>
+        <p:nvSpPr>
+          <p:cNvPr id="3" name="Symbol zastępczy zawartości 2"/>
+          <p:cNvSpPr>
+            <a:spLocks noGrp="1"/>
+          </p:cNvSpPr>
+          <p:nvPr>
+            <p:ph idx="1"/>
+          </p:nvPr>
+        </p:nvSpPr>
+        <p:spPr/>
+        <p:txBody>
+          <a:bodyPr/>
+          <a:lstStyle/>
+          <a:p>
+            <a:endParaRPr lang="pl-PL"/>
           </a:p>
         </p:txBody>
       </p:sp>
       <p:pic>
         <p:nvPicPr>
-          <p:cNvPr id="4" name="Obraz 3" descr="alpha11.jpg"/>
+          <p:cNvPr id="4" name="Obraz 3" descr="alpha22.jpg"/>
           <p:cNvPicPr/>
           <p:nvPr/>
         </p:nvPicPr>
@@ -9172,7 +9159,7 @@
         </p:blipFill>
         <p:spPr>
           <a:xfrm>
-            <a:off x="899592" y="1628800"/>
+            <a:off x="827584" y="1844824"/>
             <a:ext cx="7560000" cy="4320000"/>
           </a:xfrm>
           <a:prstGeom prst="rect">
@@ -9318,46 +9305,42 @@
         </p:nvSpPr>
         <p:spPr>
           <a:xfrm>
-            <a:off x="467544" y="0"/>
-            <a:ext cx="8229600" cy="1143000"/>
+            <a:off x="0" y="0"/>
+            <a:ext cx="9144000" cy="1143000"/>
           </a:xfrm>
         </p:spPr>
         <p:txBody>
           <a:bodyPr>
-            <a:normAutofit/>
+            <a:noAutofit/>
           </a:bodyPr>
           <a:lstStyle/>
           <a:p>
             <a:r>
               <a:rPr lang="pl-PL" sz="3500" b="1" dirty="0" smtClean="0"/>
-              <a:t>Otoczka wypukła dla zbioru P</a:t>
+              <a:t>Efekt triangulacji </a:t>
+            </a:r>
+            <a:r>
+              <a:rPr lang="pl-PL" sz="3500" b="1" dirty="0" err="1" smtClean="0"/>
+              <a:t>Delaunay</a:t>
+            </a:r>
+            <a:r>
+              <a:rPr lang="pl-PL" sz="3500" b="1" dirty="0" smtClean="0"/>
+              <a:t> </a:t>
+            </a:r>
+            <a:br>
+              <a:rPr lang="pl-PL" sz="3500" b="1" dirty="0" smtClean="0"/>
+            </a:br>
+            <a:r>
+              <a:rPr lang="pl-PL" sz="3500" b="1" dirty="0" smtClean="0"/>
+              <a:t>przeprowadzonej na zbiorze P</a:t>
             </a:r>
             <a:endParaRPr lang="pl-PL" sz="3500" b="1" dirty="0"/>
-          </a:p>
-        </p:txBody>
-      </p:sp>
-      <p:sp>
-        <p:nvSpPr>
-          <p:cNvPr id="3" name="Symbol zastępczy zawartości 2"/>
-          <p:cNvSpPr>
-            <a:spLocks noGrp="1"/>
-          </p:cNvSpPr>
-          <p:nvPr>
-            <p:ph idx="1"/>
-          </p:nvPr>
-        </p:nvSpPr>
-        <p:spPr/>
-        <p:txBody>
-          <a:bodyPr/>
-          <a:lstStyle/>
-          <a:p>
-            <a:endParaRPr lang="pl-PL"/>
           </a:p>
         </p:txBody>
       </p:sp>
       <p:pic>
         <p:nvPicPr>
-          <p:cNvPr id="4" name="Obraz 3" descr="alpha22.jpg"/>
+          <p:cNvPr id="4" name="Obraz 3" descr="alpha31.jpg"/>
           <p:cNvPicPr/>
           <p:nvPr/>
         </p:nvPicPr>
@@ -9369,7 +9352,7 @@
         </p:blipFill>
         <p:spPr>
           <a:xfrm>
-            <a:off x="827584" y="1844824"/>
+            <a:off x="899592" y="1844824"/>
             <a:ext cx="7560000" cy="4320000"/>
           </a:xfrm>
           <a:prstGeom prst="rect">
@@ -9421,34 +9404,35 @@
         </p:nvSpPr>
         <p:spPr>
           <a:xfrm>
-            <a:off x="0" y="0"/>
-            <a:ext cx="9144000" cy="1143000"/>
+            <a:off x="467544" y="0"/>
+            <a:ext cx="8229600" cy="1143000"/>
           </a:xfrm>
         </p:spPr>
         <p:txBody>
           <a:bodyPr>
-            <a:noAutofit/>
+            <a:normAutofit/>
           </a:bodyPr>
           <a:lstStyle/>
           <a:p>
             <a:r>
               <a:rPr lang="pl-PL" sz="3500" b="1" dirty="0" smtClean="0"/>
-              <a:t>Efekt triangulacji </a:t>
-            </a:r>
-            <a:r>
-              <a:rPr lang="pl-PL" sz="3500" b="1" dirty="0" err="1" smtClean="0"/>
-              <a:t>Delaunay</a:t>
+              <a:t>Kształt </a:t>
+            </a:r>
+            <a:r>
+              <a:rPr lang="el-GR" sz="3500" b="1" dirty="0" smtClean="0"/>
+              <a:t>α</a:t>
             </a:r>
             <a:r>
               <a:rPr lang="pl-PL" sz="3500" b="1" dirty="0" smtClean="0"/>
-              <a:t> </a:t>
-            </a:r>
-            <a:br>
+              <a:t> dla </a:t>
+            </a:r>
+            <a:r>
+              <a:rPr lang="el-GR" sz="3500" b="1" dirty="0" smtClean="0"/>
+              <a:t>α </a:t>
+            </a:r>
+            <a:r>
               <a:rPr lang="pl-PL" sz="3500" b="1" dirty="0" smtClean="0"/>
-            </a:br>
-            <a:r>
-              <a:rPr lang="pl-PL" sz="3500" b="1" dirty="0" smtClean="0"/>
-              <a:t>przeprowadzonej na zbiorze P</a:t>
+              <a:t>= 0.1 </a:t>
             </a:r>
             <a:endParaRPr lang="pl-PL" sz="3500" b="1" dirty="0"/>
           </a:p>
@@ -9456,7 +9440,7 @@
       </p:sp>
       <p:pic>
         <p:nvPicPr>
-          <p:cNvPr id="4" name="Obraz 3" descr="alpha31.jpg"/>
+          <p:cNvPr id="4" name="Obraz 3" descr="alpha42.jpg"/>
           <p:cNvPicPr/>
           <p:nvPr/>
         </p:nvPicPr>
@@ -9468,7 +9452,7 @@
         </p:blipFill>
         <p:spPr>
           <a:xfrm>
-            <a:off x="899592" y="1844824"/>
+            <a:off x="827584" y="1772816"/>
             <a:ext cx="7560000" cy="4320000"/>
           </a:xfrm>
           <a:prstGeom prst="rect">
@@ -9544,11 +9528,11 @@
             </a:r>
             <a:r>
               <a:rPr lang="el-GR" sz="3500" b="1" dirty="0" smtClean="0"/>
-              <a:t>α </a:t>
+              <a:t>α</a:t>
             </a:r>
             <a:r>
               <a:rPr lang="pl-PL" sz="3500" b="1" dirty="0" smtClean="0"/>
-              <a:t>= 0.1 </a:t>
+              <a:t> = 1 </a:t>
             </a:r>
             <a:endParaRPr lang="pl-PL" sz="3500" b="1" dirty="0"/>
           </a:p>
@@ -9556,7 +9540,7 @@
       </p:sp>
       <p:pic>
         <p:nvPicPr>
-          <p:cNvPr id="4" name="Obraz 3" descr="alpha42.jpg"/>
+          <p:cNvPr id="4" name="Obraz 3" descr="alpha52.jpg"/>
           <p:cNvPicPr/>
           <p:nvPr/>
         </p:nvPicPr>
@@ -9568,7 +9552,7 @@
         </p:blipFill>
         <p:spPr>
           <a:xfrm>
-            <a:off x="827584" y="1772816"/>
+            <a:off x="899592" y="1844824"/>
             <a:ext cx="7560000" cy="4320000"/>
           </a:xfrm>
           <a:prstGeom prst="rect">
@@ -9608,55 +9592,9 @@
           <a:chExt cx="0" cy="0"/>
         </a:xfrm>
       </p:grpSpPr>
-      <p:sp>
-        <p:nvSpPr>
-          <p:cNvPr id="2" name="Tytuł 1"/>
-          <p:cNvSpPr>
-            <a:spLocks noGrp="1"/>
-          </p:cNvSpPr>
-          <p:nvPr>
-            <p:ph type="title"/>
-          </p:nvPr>
-        </p:nvSpPr>
-        <p:spPr>
-          <a:xfrm>
-            <a:off x="467544" y="0"/>
-            <a:ext cx="8229600" cy="1143000"/>
-          </a:xfrm>
-        </p:spPr>
-        <p:txBody>
-          <a:bodyPr>
-            <a:normAutofit/>
-          </a:bodyPr>
-          <a:lstStyle/>
-          <a:p>
-            <a:r>
-              <a:rPr lang="pl-PL" sz="3500" b="1" dirty="0" smtClean="0"/>
-              <a:t>Kształt </a:t>
-            </a:r>
-            <a:r>
-              <a:rPr lang="el-GR" sz="3500" b="1" dirty="0" smtClean="0"/>
-              <a:t>α</a:t>
-            </a:r>
-            <a:r>
-              <a:rPr lang="pl-PL" sz="3500" b="1" dirty="0" smtClean="0"/>
-              <a:t> dla </a:t>
-            </a:r>
-            <a:r>
-              <a:rPr lang="el-GR" sz="3500" b="1" dirty="0" smtClean="0"/>
-              <a:t>α</a:t>
-            </a:r>
-            <a:r>
-              <a:rPr lang="pl-PL" sz="3500" b="1" dirty="0" smtClean="0"/>
-              <a:t> = 1 </a:t>
-            </a:r>
-            <a:endParaRPr lang="pl-PL" sz="3500" b="1" dirty="0"/>
-          </a:p>
-        </p:txBody>
-      </p:sp>
       <p:pic>
         <p:nvPicPr>
-          <p:cNvPr id="4" name="Obraz 3" descr="alpha52.jpg"/>
+          <p:cNvPr id="4" name="Obraz 3" descr="alpha62.jpg"/>
           <p:cNvPicPr/>
           <p:nvPr/>
         </p:nvPicPr>
@@ -9668,7 +9606,7 @@
         </p:blipFill>
         <p:spPr>
           <a:xfrm>
-            <a:off x="899592" y="1844824"/>
+            <a:off x="971600" y="1844824"/>
             <a:ext cx="7560000" cy="4320000"/>
           </a:xfrm>
           <a:prstGeom prst="rect">
@@ -9676,6 +9614,148 @@
           </a:prstGeom>
         </p:spPr>
       </p:pic>
+      <p:sp>
+        <p:nvSpPr>
+          <p:cNvPr id="5" name="Tytuł 1"/>
+          <p:cNvSpPr txBox="1">
+            <a:spLocks/>
+          </p:cNvSpPr>
+          <p:nvPr/>
+        </p:nvSpPr>
+        <p:spPr>
+          <a:xfrm>
+            <a:off x="467544" y="0"/>
+            <a:ext cx="8229600" cy="1143000"/>
+          </a:xfrm>
+          <a:prstGeom prst="rect">
+            <a:avLst/>
+          </a:prstGeom>
+        </p:spPr>
+        <p:txBody>
+          <a:bodyPr vert="horz" lIns="91440" tIns="45720" rIns="91440" bIns="45720" rtlCol="0" anchor="ctr">
+            <a:normAutofit/>
+          </a:bodyPr>
+          <a:lstStyle/>
+          <a:p>
+            <a:pPr marL="0" marR="0" lvl="0" indent="0" algn="ctr" defTabSz="914400" rtl="0" eaLnBrk="1" fontAlgn="auto" latinLnBrk="0" hangingPunct="1">
+              <a:lnSpc>
+                <a:spcPct val="100000"/>
+              </a:lnSpc>
+              <a:spcBef>
+                <a:spcPct val="0"/>
+              </a:spcBef>
+              <a:spcAft>
+                <a:spcPts val="0"/>
+              </a:spcAft>
+              <a:buClrTx/>
+              <a:buSzTx/>
+              <a:buFontTx/>
+              <a:buNone/>
+              <a:tabLst/>
+              <a:defRPr/>
+            </a:pPr>
+            <a:r>
+              <a:rPr kumimoji="0" lang="pl-PL" sz="3500" b="1" i="0" u="none" strike="noStrike" kern="1200" cap="none" spc="0" normalizeH="0" baseline="0" noProof="0" dirty="0" smtClean="0">
+                <a:ln>
+                  <a:noFill/>
+                </a:ln>
+                <a:solidFill>
+                  <a:schemeClr val="tx1"/>
+                </a:solidFill>
+                <a:effectLst/>
+                <a:uLnTx/>
+                <a:uFillTx/>
+                <a:latin typeface="+mj-lt"/>
+                <a:ea typeface="+mj-ea"/>
+                <a:cs typeface="+mj-cs"/>
+              </a:rPr>
+              <a:t>Kształt </a:t>
+            </a:r>
+            <a:r>
+              <a:rPr kumimoji="0" lang="el-GR" sz="3500" b="1" i="0" u="none" strike="noStrike" kern="1200" cap="none" spc="0" normalizeH="0" baseline="0" noProof="0" dirty="0" smtClean="0">
+                <a:ln>
+                  <a:noFill/>
+                </a:ln>
+                <a:solidFill>
+                  <a:schemeClr val="tx1"/>
+                </a:solidFill>
+                <a:effectLst/>
+                <a:uLnTx/>
+                <a:uFillTx/>
+                <a:latin typeface="+mj-lt"/>
+                <a:ea typeface="+mj-ea"/>
+                <a:cs typeface="+mj-cs"/>
+              </a:rPr>
+              <a:t>α</a:t>
+            </a:r>
+            <a:r>
+              <a:rPr kumimoji="0" lang="pl-PL" sz="3500" b="1" i="0" u="none" strike="noStrike" kern="1200" cap="none" spc="0" normalizeH="0" baseline="0" noProof="0" dirty="0" smtClean="0">
+                <a:ln>
+                  <a:noFill/>
+                </a:ln>
+                <a:solidFill>
+                  <a:schemeClr val="tx1"/>
+                </a:solidFill>
+                <a:effectLst/>
+                <a:uLnTx/>
+                <a:uFillTx/>
+                <a:latin typeface="+mj-lt"/>
+                <a:ea typeface="+mj-ea"/>
+                <a:cs typeface="+mj-cs"/>
+              </a:rPr>
+              <a:t> dla </a:t>
+            </a:r>
+            <a:r>
+              <a:rPr kumimoji="0" lang="el-GR" sz="3500" b="1" i="0" u="none" strike="noStrike" kern="1200" cap="none" spc="0" normalizeH="0" baseline="0" noProof="0" dirty="0" smtClean="0">
+                <a:ln>
+                  <a:noFill/>
+                </a:ln>
+                <a:solidFill>
+                  <a:schemeClr val="tx1"/>
+                </a:solidFill>
+                <a:effectLst/>
+                <a:uLnTx/>
+                <a:uFillTx/>
+                <a:latin typeface="+mj-lt"/>
+                <a:ea typeface="+mj-ea"/>
+                <a:cs typeface="+mj-cs"/>
+              </a:rPr>
+              <a:t>α </a:t>
+            </a:r>
+            <a:r>
+              <a:rPr kumimoji="0" lang="pl-PL" sz="3500" b="1" i="0" u="none" strike="noStrike" kern="1200" cap="none" spc="0" normalizeH="0" baseline="0" noProof="0" dirty="0" smtClean="0">
+                <a:ln>
+                  <a:noFill/>
+                </a:ln>
+                <a:solidFill>
+                  <a:schemeClr val="tx1"/>
+                </a:solidFill>
+                <a:effectLst/>
+                <a:uLnTx/>
+                <a:uFillTx/>
+                <a:latin typeface="+mj-lt"/>
+                <a:ea typeface="+mj-ea"/>
+                <a:cs typeface="+mj-cs"/>
+              </a:rPr>
+              <a:t>= 0.24 </a:t>
+            </a:r>
+            <a:endParaRPr kumimoji="0" lang="pl-PL" sz="3500" b="1" i="0" u="none" strike="noStrike" kern="1200" cap="none" spc="0" normalizeH="0" baseline="0" noProof="0" dirty="0">
+              <a:ln>
+                <a:noFill/>
+              </a:ln>
+              <a:solidFill>
+                <a:schemeClr val="tx1"/>
+              </a:solidFill>
+              <a:effectLst/>
+              <a:uLnTx/>
+              <a:uFillTx/>
+              <a:latin typeface="+mj-lt"/>
+              <a:ea typeface="+mj-ea"/>
+              <a:cs typeface="+mj-cs"/>
+            </a:endParaRPr>
+          </a:p>
+        </p:txBody>
+      </p:sp>
     </p:spTree>
   </p:cSld>
   <p:clrMapOvr>
@@ -9708,167 +9788,141 @@
           <a:chExt cx="0" cy="0"/>
         </a:xfrm>
       </p:grpSpPr>
-      <p:pic>
-        <p:nvPicPr>
-          <p:cNvPr id="4" name="Obraz 3" descr="alpha62.jpg"/>
-          <p:cNvPicPr/>
-          <p:nvPr/>
-        </p:nvPicPr>
-        <p:blipFill>
-          <a:blip r:embed="rId3" cstate="print"/>
-          <a:stretch>
-            <a:fillRect/>
-          </a:stretch>
-        </p:blipFill>
-        <p:spPr>
-          <a:xfrm>
-            <a:off x="971600" y="1844824"/>
-            <a:ext cx="7560000" cy="4320000"/>
-          </a:xfrm>
-          <a:prstGeom prst="rect">
-            <a:avLst/>
-          </a:prstGeom>
-        </p:spPr>
-      </p:pic>
-      <p:sp>
-        <p:nvSpPr>
-          <p:cNvPr id="5" name="Tytuł 1"/>
-          <p:cNvSpPr txBox="1">
-            <a:spLocks/>
-          </p:cNvSpPr>
-          <p:nvPr/>
+      <p:sp>
+        <p:nvSpPr>
+          <p:cNvPr id="2" name="Tytuł 1"/>
+          <p:cNvSpPr>
+            <a:spLocks noGrp="1"/>
+          </p:cNvSpPr>
+          <p:nvPr>
+            <p:ph type="title"/>
+          </p:nvPr>
         </p:nvSpPr>
         <p:spPr>
           <a:xfrm>
             <a:off x="467544" y="0"/>
             <a:ext cx="8229600" cy="1143000"/>
           </a:xfrm>
-          <a:prstGeom prst="rect">
-            <a:avLst/>
-          </a:prstGeom>
         </p:spPr>
         <p:txBody>
-          <a:bodyPr vert="horz" lIns="91440" tIns="45720" rIns="91440" bIns="45720" rtlCol="0" anchor="ctr">
+          <a:bodyPr>
             <a:normAutofit/>
           </a:bodyPr>
           <a:lstStyle/>
           <a:p>
-            <a:pPr marL="0" marR="0" lvl="0" indent="0" algn="ctr" defTabSz="914400" rtl="0" eaLnBrk="1" fontAlgn="auto" latinLnBrk="0" hangingPunct="1">
-              <a:lnSpc>
-                <a:spcPct val="100000"/>
-              </a:lnSpc>
-              <a:spcBef>
-                <a:spcPct val="0"/>
-              </a:spcBef>
-              <a:spcAft>
-                <a:spcPts val="0"/>
-              </a:spcAft>
-              <a:buClrTx/>
-              <a:buSzTx/>
-              <a:buFontTx/>
-              <a:buNone/>
-              <a:tabLst/>
-              <a:defRPr/>
-            </a:pPr>
-            <a:r>
-              <a:rPr kumimoji="0" lang="pl-PL" sz="3500" b="1" i="0" u="none" strike="noStrike" kern="1200" cap="none" spc="0" normalizeH="0" baseline="0" noProof="0" dirty="0" smtClean="0">
-                <a:ln>
-                  <a:noFill/>
-                </a:ln>
-                <a:solidFill>
-                  <a:schemeClr val="tx1"/>
-                </a:solidFill>
-                <a:effectLst/>
-                <a:uLnTx/>
-                <a:uFillTx/>
-                <a:latin typeface="+mj-lt"/>
-                <a:ea typeface="+mj-ea"/>
-                <a:cs typeface="+mj-cs"/>
-              </a:rPr>
-              <a:t>Kształt </a:t>
-            </a:r>
-            <a:r>
-              <a:rPr kumimoji="0" lang="el-GR" sz="3500" b="1" i="0" u="none" strike="noStrike" kern="1200" cap="none" spc="0" normalizeH="0" baseline="0" noProof="0" dirty="0" smtClean="0">
-                <a:ln>
-                  <a:noFill/>
-                </a:ln>
-                <a:solidFill>
-                  <a:schemeClr val="tx1"/>
-                </a:solidFill>
-                <a:effectLst/>
-                <a:uLnTx/>
-                <a:uFillTx/>
-                <a:latin typeface="+mj-lt"/>
-                <a:ea typeface="+mj-ea"/>
-                <a:cs typeface="+mj-cs"/>
-              </a:rPr>
-              <a:t>α</a:t>
-            </a:r>
-            <a:r>
-              <a:rPr kumimoji="0" lang="pl-PL" sz="3500" b="1" i="0" u="none" strike="noStrike" kern="1200" cap="none" spc="0" normalizeH="0" baseline="0" noProof="0" dirty="0" smtClean="0">
-                <a:ln>
-                  <a:noFill/>
-                </a:ln>
-                <a:solidFill>
-                  <a:schemeClr val="tx1"/>
-                </a:solidFill>
-                <a:effectLst/>
-                <a:uLnTx/>
-                <a:uFillTx/>
-                <a:latin typeface="+mj-lt"/>
-                <a:ea typeface="+mj-ea"/>
-                <a:cs typeface="+mj-cs"/>
-              </a:rPr>
-              <a:t> dla </a:t>
-            </a:r>
-            <a:r>
-              <a:rPr kumimoji="0" lang="el-GR" sz="3500" b="1" i="0" u="none" strike="noStrike" kern="1200" cap="none" spc="0" normalizeH="0" baseline="0" noProof="0" dirty="0" smtClean="0">
-                <a:ln>
-                  <a:noFill/>
-                </a:ln>
-                <a:solidFill>
-                  <a:schemeClr val="tx1"/>
-                </a:solidFill>
-                <a:effectLst/>
-                <a:uLnTx/>
-                <a:uFillTx/>
-                <a:latin typeface="+mj-lt"/>
-                <a:ea typeface="+mj-ea"/>
-                <a:cs typeface="+mj-cs"/>
-              </a:rPr>
-              <a:t>α </a:t>
-            </a:r>
-            <a:r>
-              <a:rPr kumimoji="0" lang="pl-PL" sz="3500" b="1" i="0" u="none" strike="noStrike" kern="1200" cap="none" spc="0" normalizeH="0" baseline="0" noProof="0" dirty="0" smtClean="0">
-                <a:ln>
-                  <a:noFill/>
-                </a:ln>
-                <a:solidFill>
-                  <a:schemeClr val="tx1"/>
-                </a:solidFill>
-                <a:effectLst/>
-                <a:uLnTx/>
-                <a:uFillTx/>
-                <a:latin typeface="+mj-lt"/>
-                <a:ea typeface="+mj-ea"/>
-                <a:cs typeface="+mj-cs"/>
-              </a:rPr>
-              <a:t>= 0.24 </a:t>
-            </a:r>
-            <a:endParaRPr kumimoji="0" lang="pl-PL" sz="3500" b="1" i="0" u="none" strike="noStrike" kern="1200" cap="none" spc="0" normalizeH="0" baseline="0" noProof="0" dirty="0">
-              <a:ln>
-                <a:noFill/>
-              </a:ln>
-              <a:solidFill>
-                <a:schemeClr val="tx1"/>
-              </a:solidFill>
-              <a:effectLst/>
-              <a:uLnTx/>
-              <a:uFillTx/>
-              <a:latin typeface="+mj-lt"/>
-              <a:ea typeface="+mj-ea"/>
-              <a:cs typeface="+mj-cs"/>
-            </a:endParaRPr>
+            <a:r>
+              <a:rPr lang="pl-PL" sz="3500" b="1" dirty="0" smtClean="0"/>
+              <a:t>Stworzony system informatyczny</a:t>
+            </a:r>
+            <a:endParaRPr lang="pl-PL" sz="3500" b="1" dirty="0"/>
+          </a:p>
+        </p:txBody>
+      </p:sp>
+      <p:sp>
+        <p:nvSpPr>
+          <p:cNvPr id="3" name="Symbol zastępczy zawartości 2"/>
+          <p:cNvSpPr>
+            <a:spLocks noGrp="1"/>
+          </p:cNvSpPr>
+          <p:nvPr>
+            <p:ph idx="1"/>
+          </p:nvPr>
+        </p:nvSpPr>
+        <p:spPr/>
+        <p:txBody>
+          <a:bodyPr>
+            <a:normAutofit/>
+          </a:bodyPr>
+          <a:lstStyle/>
+          <a:p>
+            <a:pPr lvl="0"/>
+            <a:r>
+              <a:rPr lang="pl-PL" sz="2500" dirty="0" smtClean="0">
+                <a:effectLst>
+                  <a:outerShdw blurRad="38100" dist="38100" dir="2700000" algn="tl">
+                    <a:srgbClr val="000000">
+                      <a:alpha val="43137"/>
+                    </a:srgbClr>
+                  </a:outerShdw>
+                </a:effectLst>
+              </a:rPr>
+              <a:t>aplikacja mobilna </a:t>
+            </a:r>
+            <a:r>
+              <a:rPr lang="pl-PL" sz="2500" dirty="0" smtClean="0"/>
+              <a:t>– </a:t>
+            </a:r>
+            <a:r>
+              <a:rPr lang="pl-PL" sz="2500" i="1" dirty="0" err="1" smtClean="0"/>
+              <a:t>DronTracker</a:t>
+            </a:r>
+            <a:r>
+              <a:rPr lang="pl-PL" sz="2500" dirty="0" smtClean="0"/>
+              <a:t> - pełniąca rolę geolokalizatora ,do potencjalnego zamontowania na dronie, </a:t>
+            </a:r>
+          </a:p>
+          <a:p>
+            <a:endParaRPr lang="pl-PL" sz="2500" dirty="0" smtClean="0"/>
+          </a:p>
+          <a:p>
+            <a:pPr lvl="0"/>
+            <a:r>
+              <a:rPr lang="pl-PL" sz="2500" dirty="0" smtClean="0">
+                <a:effectLst>
+                  <a:outerShdw blurRad="38100" dist="38100" dir="2700000" algn="tl">
+                    <a:srgbClr val="000000">
+                      <a:alpha val="43137"/>
+                    </a:srgbClr>
+                  </a:outerShdw>
+                </a:effectLst>
+              </a:rPr>
+              <a:t>aplikacja serwerowa </a:t>
+            </a:r>
+            <a:r>
+              <a:rPr lang="pl-PL" sz="2500" dirty="0" smtClean="0"/>
+              <a:t>– </a:t>
+            </a:r>
+            <a:r>
+              <a:rPr lang="pl-PL" sz="2500" i="1" dirty="0" err="1" smtClean="0"/>
+              <a:t>DronSerwer</a:t>
+            </a:r>
+            <a:r>
+              <a:rPr lang="pl-PL" sz="2500" dirty="0" smtClean="0"/>
+              <a:t> – odpowiedzialna za przeprowadzanie skomplikowanych obliczeń i komunikację z pozostałymi elementami systemu oraz</a:t>
+            </a:r>
+          </a:p>
+          <a:p>
+            <a:endParaRPr lang="pl-PL" sz="2500" dirty="0" smtClean="0"/>
+          </a:p>
+          <a:p>
+            <a:pPr lvl="0"/>
+            <a:r>
+              <a:rPr lang="pl-PL" sz="2500" dirty="0" smtClean="0">
+                <a:effectLst>
+                  <a:outerShdw blurRad="38100" dist="38100" dir="2700000" algn="tl">
+                    <a:srgbClr val="000000">
+                      <a:alpha val="43137"/>
+                    </a:srgbClr>
+                  </a:outerShdw>
+                </a:effectLst>
+              </a:rPr>
+              <a:t>główna mobilna aplikacja kliencka </a:t>
+            </a:r>
+            <a:r>
+              <a:rPr lang="pl-PL" sz="2500" dirty="0" smtClean="0"/>
+              <a:t>– </a:t>
+            </a:r>
+            <a:r>
+              <a:rPr lang="pl-PL" sz="2500" i="1" dirty="0" err="1" smtClean="0"/>
+              <a:t>DronVision</a:t>
+            </a:r>
+            <a:r>
+              <a:rPr lang="pl-PL" sz="2500" dirty="0" smtClean="0"/>
+              <a:t> - służąca do wizualizacji wyznaczonego obszaru przeszukanego.</a:t>
+            </a:r>
+          </a:p>
+          <a:p>
+            <a:endParaRPr lang="pl-PL" sz="2500" dirty="0"/>
           </a:p>
         </p:txBody>
       </p:sp>
@@ -9888,176 +9942,6 @@
 </file>
 
 <file path=ppt/slides/slide25.xml><?xml version="1.0" encoding="utf-8"?>
-<p:sld xmlns:a="http://schemas.openxmlformats.org/drawingml/2006/main" xmlns:r="http://schemas.openxmlformats.org/officeDocument/2006/relationships" xmlns:p="http://schemas.openxmlformats.org/presentationml/2006/main">
-  <p:cSld>
-    <p:spTree>
-      <p:nvGrpSpPr>
-        <p:cNvPr id="1" name=""/>
-        <p:cNvGrpSpPr/>
-        <p:nvPr/>
-      </p:nvGrpSpPr>
-      <p:grpSpPr>
-        <a:xfrm>
-          <a:off x="0" y="0"/>
-          <a:ext cx="0" cy="0"/>
-          <a:chOff x="0" y="0"/>
-          <a:chExt cx="0" cy="0"/>
-        </a:xfrm>
-      </p:grpSpPr>
-      <p:sp>
-        <p:nvSpPr>
-          <p:cNvPr id="2" name="Tytuł 1"/>
-          <p:cNvSpPr>
-            <a:spLocks noGrp="1"/>
-          </p:cNvSpPr>
-          <p:nvPr>
-            <p:ph type="title"/>
-          </p:nvPr>
-        </p:nvSpPr>
-        <p:spPr>
-          <a:xfrm>
-            <a:off x="467544" y="0"/>
-            <a:ext cx="8229600" cy="1143000"/>
-          </a:xfrm>
-        </p:spPr>
-        <p:txBody>
-          <a:bodyPr>
-            <a:normAutofit/>
-          </a:bodyPr>
-          <a:lstStyle/>
-          <a:p>
-            <a:r>
-              <a:rPr lang="pl-PL" sz="3500" b="1" dirty="0" smtClean="0"/>
-              <a:t>Stworzony system informatyczny</a:t>
-            </a:r>
-            <a:endParaRPr lang="pl-PL" sz="3500" b="1" dirty="0"/>
-          </a:p>
-        </p:txBody>
-      </p:sp>
-      <p:sp>
-        <p:nvSpPr>
-          <p:cNvPr id="3" name="Symbol zastępczy zawartości 2"/>
-          <p:cNvSpPr>
-            <a:spLocks noGrp="1"/>
-          </p:cNvSpPr>
-          <p:nvPr>
-            <p:ph idx="1"/>
-          </p:nvPr>
-        </p:nvSpPr>
-        <p:spPr/>
-        <p:txBody>
-          <a:bodyPr>
-            <a:normAutofit/>
-          </a:bodyPr>
-          <a:lstStyle/>
-          <a:p>
-            <a:pPr lvl="0"/>
-            <a:r>
-              <a:rPr lang="pl-PL" sz="2500" dirty="0" smtClean="0">
-                <a:effectLst>
-                  <a:outerShdw blurRad="38100" dist="38100" dir="2700000" algn="tl">
-                    <a:srgbClr val="000000">
-                      <a:alpha val="43137"/>
-                    </a:srgbClr>
-                  </a:outerShdw>
-                </a:effectLst>
-              </a:rPr>
-              <a:t>aplikacja mobilna </a:t>
-            </a:r>
-            <a:r>
-              <a:rPr lang="pl-PL" sz="2500" dirty="0" smtClean="0"/>
-              <a:t>– </a:t>
-            </a:r>
-            <a:r>
-              <a:rPr lang="pl-PL" sz="2500" i="1" dirty="0" err="1" smtClean="0"/>
-              <a:t>DronTracker</a:t>
-            </a:r>
-            <a:r>
-              <a:rPr lang="pl-PL" sz="2500" dirty="0" smtClean="0"/>
-              <a:t> - pełniąca rolę geolokalizatora ,do potencjalnego zamontowania na dronie, </a:t>
-            </a:r>
-          </a:p>
-          <a:p>
-            <a:endParaRPr lang="pl-PL" sz="2500" dirty="0" smtClean="0"/>
-          </a:p>
-          <a:p>
-            <a:pPr lvl="0"/>
-            <a:r>
-              <a:rPr lang="pl-PL" sz="2500" dirty="0" smtClean="0">
-                <a:effectLst>
-                  <a:outerShdw blurRad="38100" dist="38100" dir="2700000" algn="tl">
-                    <a:srgbClr val="000000">
-                      <a:alpha val="43137"/>
-                    </a:srgbClr>
-                  </a:outerShdw>
-                </a:effectLst>
-              </a:rPr>
-              <a:t>aplikacja serwerowa </a:t>
-            </a:r>
-            <a:r>
-              <a:rPr lang="pl-PL" sz="2500" dirty="0" smtClean="0"/>
-              <a:t>– </a:t>
-            </a:r>
-            <a:r>
-              <a:rPr lang="pl-PL" sz="2500" i="1" dirty="0" err="1" smtClean="0"/>
-              <a:t>DronSerwer</a:t>
-            </a:r>
-            <a:r>
-              <a:rPr lang="pl-PL" sz="2500" dirty="0" smtClean="0"/>
-              <a:t> – odpowiedzialna za przeprowadzanie skomplikowanych obliczeń i komunikację z pozostałymi elementami systemu oraz</a:t>
-            </a:r>
-          </a:p>
-          <a:p>
-            <a:endParaRPr lang="pl-PL" sz="2500" dirty="0" smtClean="0"/>
-          </a:p>
-          <a:p>
-            <a:pPr lvl="0"/>
-            <a:r>
-              <a:rPr lang="pl-PL" sz="2500" dirty="0" smtClean="0">
-                <a:effectLst>
-                  <a:outerShdw blurRad="38100" dist="38100" dir="2700000" algn="tl">
-                    <a:srgbClr val="000000">
-                      <a:alpha val="43137"/>
-                    </a:srgbClr>
-                  </a:outerShdw>
-                </a:effectLst>
-              </a:rPr>
-              <a:t>główna mobilna aplikacja kliencka </a:t>
-            </a:r>
-            <a:r>
-              <a:rPr lang="pl-PL" sz="2500" dirty="0" smtClean="0"/>
-              <a:t>– </a:t>
-            </a:r>
-            <a:r>
-              <a:rPr lang="pl-PL" sz="2500" i="1" dirty="0" err="1" smtClean="0"/>
-              <a:t>DronVision</a:t>
-            </a:r>
-            <a:r>
-              <a:rPr lang="pl-PL" sz="2500" dirty="0" smtClean="0"/>
-              <a:t> - służąca do wizualizacji wyznaczonego obszaru przeszukanego.</a:t>
-            </a:r>
-          </a:p>
-          <a:p>
-            <a:endParaRPr lang="pl-PL" sz="2500" dirty="0"/>
-          </a:p>
-        </p:txBody>
-      </p:sp>
-    </p:spTree>
-  </p:cSld>
-  <p:clrMapOvr>
-    <a:masterClrMapping/>
-  </p:clrMapOvr>
-  <p:timing>
-    <p:tnLst>
-      <p:par>
-        <p:cTn id="1" dur="indefinite" restart="never" nodeType="tmRoot"/>
-      </p:par>
-    </p:tnLst>
-  </p:timing>
-</p:sld>
-</file>
-
-<file path=ppt/slides/slide26.xml><?xml version="1.0" encoding="utf-8"?>
 <p:sld xmlns:a="http://schemas.openxmlformats.org/drawingml/2006/main" xmlns:r="http://schemas.openxmlformats.org/officeDocument/2006/relationships" xmlns:p="http://schemas.openxmlformats.org/presentationml/2006/main">
   <p:cSld>
     <p:spTree>
@@ -10222,7 +10106,7 @@
 </p:sld>
 </file>
 
-<file path=ppt/slides/slide27.xml><?xml version="1.0" encoding="utf-8"?>
+<file path=ppt/slides/slide26.xml><?xml version="1.0" encoding="utf-8"?>
 <p:sld xmlns:a="http://schemas.openxmlformats.org/drawingml/2006/main" xmlns:r="http://schemas.openxmlformats.org/officeDocument/2006/relationships" xmlns:p="http://schemas.openxmlformats.org/presentationml/2006/main">
   <p:cSld>
     <p:spTree>

</xml_diff>